<commit_message>
pptx in relativity form
</commit_message>
<xml_diff>
--- a/ContractDistribution/ContractDistribution.pptx
+++ b/ContractDistribution/ContractDistribution.pptx
@@ -145,15 +145,15 @@
 </file>
 
 <file path=ppt/diagrams/colors1.xml><?xml version="1.0" encoding="utf-8"?>
-<dgm:colorsDef xmlns:dgm="http://schemas.openxmlformats.org/drawingml/2006/diagram" xmlns:a="http://schemas.openxmlformats.org/drawingml/2006/main" uniqueId="urn:microsoft.com/office/officeart/2005/8/colors/colorful2">
+<dgm:colorsDef xmlns:dgm="http://schemas.openxmlformats.org/drawingml/2006/diagram" xmlns:a="http://schemas.openxmlformats.org/drawingml/2006/main" uniqueId="urn:microsoft.com/office/officeart/2005/8/colors/accent6_2">
   <dgm:title val=""/>
   <dgm:desc val=""/>
   <dgm:catLst>
-    <dgm:cat type="colorful" pri="10200"/>
+    <dgm:cat type="accent6" pri="11200"/>
   </dgm:catLst>
   <dgm:styleLbl name="node0">
     <dgm:fillClrLst meth="repeat">
-      <a:schemeClr val="accent1"/>
+      <a:schemeClr val="accent6"/>
     </dgm:fillClrLst>
     <dgm:linClrLst meth="repeat">
       <a:schemeClr val="lt1"/>
@@ -164,9 +164,8 @@
     <dgm:txEffectClrLst/>
   </dgm:styleLbl>
   <dgm:styleLbl name="node1">
-    <dgm:fillClrLst>
-      <a:schemeClr val="accent2"/>
-      <a:schemeClr val="accent3"/>
+    <dgm:fillClrLst meth="repeat">
+      <a:schemeClr val="accent6"/>
     </dgm:fillClrLst>
     <dgm:linClrLst meth="repeat">
       <a:schemeClr val="lt1"/>
@@ -177,13 +176,11 @@
     <dgm:txEffectClrLst/>
   </dgm:styleLbl>
   <dgm:styleLbl name="alignNode1">
-    <dgm:fillClrLst>
-      <a:schemeClr val="accent2"/>
-      <a:schemeClr val="accent3"/>
+    <dgm:fillClrLst meth="repeat">
+      <a:schemeClr val="accent6"/>
     </dgm:fillClrLst>
-    <dgm:linClrLst>
-      <a:schemeClr val="accent2"/>
-      <a:schemeClr val="accent3"/>
+    <dgm:linClrLst meth="repeat">
+      <a:schemeClr val="accent6"/>
     </dgm:linClrLst>
     <dgm:effectClrLst/>
     <dgm:txLinClrLst/>
@@ -191,9 +188,8 @@
     <dgm:txEffectClrLst/>
   </dgm:styleLbl>
   <dgm:styleLbl name="lnNode1">
-    <dgm:fillClrLst>
-      <a:schemeClr val="accent2"/>
-      <a:schemeClr val="accent3"/>
+    <dgm:fillClrLst meth="repeat">
+      <a:schemeClr val="accent6"/>
     </dgm:fillClrLst>
     <dgm:linClrLst meth="repeat">
       <a:schemeClr val="lt1"/>
@@ -204,11 +200,8 @@
     <dgm:txEffectClrLst/>
   </dgm:styleLbl>
   <dgm:styleLbl name="vennNode1">
-    <dgm:fillClrLst>
-      <a:schemeClr val="accent2">
-        <a:alpha val="50000"/>
-      </a:schemeClr>
-      <a:schemeClr val="accent3">
+    <dgm:fillClrLst meth="repeat">
+      <a:schemeClr val="accent6">
         <a:alpha val="50000"/>
       </a:schemeClr>
     </dgm:fillClrLst>
@@ -221,8 +214,8 @@
     <dgm:txEffectClrLst/>
   </dgm:styleLbl>
   <dgm:styleLbl name="node2">
-    <dgm:fillClrLst>
-      <a:schemeClr val="accent3"/>
+    <dgm:fillClrLst meth="repeat">
+      <a:schemeClr val="accent6"/>
     </dgm:fillClrLst>
     <dgm:linClrLst meth="repeat">
       <a:schemeClr val="lt1"/>
@@ -233,8 +226,8 @@
     <dgm:txEffectClrLst/>
   </dgm:styleLbl>
   <dgm:styleLbl name="node3">
-    <dgm:fillClrLst>
-      <a:schemeClr val="accent4"/>
+    <dgm:fillClrLst meth="repeat">
+      <a:schemeClr val="accent6"/>
     </dgm:fillClrLst>
     <dgm:linClrLst meth="repeat">
       <a:schemeClr val="lt1"/>
@@ -245,8 +238,8 @@
     <dgm:txEffectClrLst/>
   </dgm:styleLbl>
   <dgm:styleLbl name="node4">
-    <dgm:fillClrLst>
-      <a:schemeClr val="accent5"/>
+    <dgm:fillClrLst meth="repeat">
+      <a:schemeClr val="accent6"/>
     </dgm:fillClrLst>
     <dgm:linClrLst meth="repeat">
       <a:schemeClr val="lt1"/>
@@ -257,11 +250,8 @@
     <dgm:txEffectClrLst/>
   </dgm:styleLbl>
   <dgm:styleLbl name="fgImgPlace1">
-    <dgm:fillClrLst>
-      <a:schemeClr val="accent2">
-        <a:tint val="50000"/>
-      </a:schemeClr>
-      <a:schemeClr val="accent3">
+    <dgm:fillClrLst meth="repeat">
+      <a:schemeClr val="accent6">
         <a:tint val="50000"/>
       </a:schemeClr>
     </dgm:fillClrLst>
@@ -276,12 +266,9 @@
     <dgm:txEffectClrLst/>
   </dgm:styleLbl>
   <dgm:styleLbl name="alignImgPlace1">
-    <dgm:fillClrLst>
-      <a:schemeClr val="accent2">
+    <dgm:fillClrLst meth="repeat">
+      <a:schemeClr val="accent6">
         <a:tint val="50000"/>
-      </a:schemeClr>
-      <a:schemeClr val="accent3">
-        <a:tint val="20000"/>
       </a:schemeClr>
     </dgm:fillClrLst>
     <dgm:linClrLst meth="repeat">
@@ -295,12 +282,9 @@
     <dgm:txEffectClrLst/>
   </dgm:styleLbl>
   <dgm:styleLbl name="bgImgPlace1">
-    <dgm:fillClrLst>
-      <a:schemeClr val="accent2">
+    <dgm:fillClrLst meth="repeat">
+      <a:schemeClr val="accent6">
         <a:tint val="50000"/>
-      </a:schemeClr>
-      <a:schemeClr val="accent3">
-        <a:tint val="20000"/>
       </a:schemeClr>
     </dgm:fillClrLst>
     <dgm:linClrLst meth="repeat">
@@ -314,12 +298,15 @@
     <dgm:txEffectClrLst/>
   </dgm:styleLbl>
   <dgm:styleLbl name="sibTrans2D1">
-    <dgm:fillClrLst>
-      <a:schemeClr val="accent2"/>
-      <a:schemeClr val="accent3"/>
+    <dgm:fillClrLst meth="repeat">
+      <a:schemeClr val="accent6">
+        <a:tint val="60000"/>
+      </a:schemeClr>
     </dgm:fillClrLst>
     <dgm:linClrLst meth="repeat">
-      <a:schemeClr val="lt1"/>
+      <a:schemeClr val="accent6">
+        <a:tint val="60000"/>
+      </a:schemeClr>
     </dgm:linClrLst>
     <dgm:effectClrLst/>
     <dgm:txLinClrLst/>
@@ -327,40 +314,43 @@
     <dgm:txEffectClrLst/>
   </dgm:styleLbl>
   <dgm:styleLbl name="fgSibTrans2D1">
-    <dgm:fillClrLst>
-      <a:schemeClr val="accent2"/>
-      <a:schemeClr val="accent3"/>
+    <dgm:fillClrLst meth="repeat">
+      <a:schemeClr val="accent6">
+        <a:tint val="60000"/>
+      </a:schemeClr>
     </dgm:fillClrLst>
     <dgm:linClrLst meth="repeat">
-      <a:schemeClr val="lt1"/>
+      <a:schemeClr val="accent6">
+        <a:tint val="60000"/>
+      </a:schemeClr>
     </dgm:linClrLst>
     <dgm:effectClrLst/>
     <dgm:txLinClrLst/>
-    <dgm:txFillClrLst meth="repeat">
-      <a:schemeClr val="lt1"/>
-    </dgm:txFillClrLst>
+    <dgm:txFillClrLst/>
     <dgm:txEffectClrLst/>
   </dgm:styleLbl>
   <dgm:styleLbl name="bgSibTrans2D1">
-    <dgm:fillClrLst>
-      <a:schemeClr val="accent2"/>
-      <a:schemeClr val="accent3"/>
+    <dgm:fillClrLst meth="repeat">
+      <a:schemeClr val="accent6">
+        <a:tint val="60000"/>
+      </a:schemeClr>
     </dgm:fillClrLst>
     <dgm:linClrLst meth="repeat">
-      <a:schemeClr val="lt1"/>
+      <a:schemeClr val="accent6">
+        <a:tint val="60000"/>
+      </a:schemeClr>
     </dgm:linClrLst>
     <dgm:effectClrLst/>
     <dgm:txLinClrLst/>
-    <dgm:txFillClrLst meth="repeat">
-      <a:schemeClr val="lt1"/>
-    </dgm:txFillClrLst>
+    <dgm:txFillClrLst/>
     <dgm:txEffectClrLst/>
   </dgm:styleLbl>
   <dgm:styleLbl name="sibTrans1D1">
-    <dgm:fillClrLst/>
-    <dgm:linClrLst>
-      <a:schemeClr val="accent2"/>
-      <a:schemeClr val="accent3"/>
+    <dgm:fillClrLst meth="repeat">
+      <a:schemeClr val="accent6"/>
+    </dgm:fillClrLst>
+    <dgm:linClrLst meth="repeat">
+      <a:schemeClr val="accent6"/>
     </dgm:linClrLst>
     <dgm:effectClrLst/>
     <dgm:txLinClrLst/>
@@ -371,10 +361,10 @@
   </dgm:styleLbl>
   <dgm:styleLbl name="callout">
     <dgm:fillClrLst meth="repeat">
-      <a:schemeClr val="accent2"/>
+      <a:schemeClr val="accent6"/>
     </dgm:fillClrLst>
     <dgm:linClrLst meth="repeat">
-      <a:schemeClr val="accent2">
+      <a:schemeClr val="accent6">
         <a:tint val="50000"/>
       </a:schemeClr>
     </dgm:linClrLst>
@@ -387,12 +377,10 @@
   </dgm:styleLbl>
   <dgm:styleLbl name="asst0">
     <dgm:fillClrLst meth="repeat">
-      <a:schemeClr val="accent2"/>
+      <a:schemeClr val="accent6"/>
     </dgm:fillClrLst>
     <dgm:linClrLst meth="repeat">
-      <a:schemeClr val="lt1">
-        <a:shade val="80000"/>
-      </a:schemeClr>
+      <a:schemeClr val="lt1"/>
     </dgm:linClrLst>
     <dgm:effectClrLst/>
     <dgm:txLinClrLst/>
@@ -401,12 +389,10 @@
   </dgm:styleLbl>
   <dgm:styleLbl name="asst1">
     <dgm:fillClrLst meth="repeat">
-      <a:schemeClr val="accent3"/>
+      <a:schemeClr val="accent6"/>
     </dgm:fillClrLst>
     <dgm:linClrLst meth="repeat">
-      <a:schemeClr val="lt1">
-        <a:shade val="80000"/>
-      </a:schemeClr>
+      <a:schemeClr val="lt1"/>
     </dgm:linClrLst>
     <dgm:effectClrLst/>
     <dgm:txLinClrLst/>
@@ -414,8 +400,8 @@
     <dgm:txEffectClrLst/>
   </dgm:styleLbl>
   <dgm:styleLbl name="asst2">
-    <dgm:fillClrLst>
-      <a:schemeClr val="accent4"/>
+    <dgm:fillClrLst meth="repeat">
+      <a:schemeClr val="accent6"/>
     </dgm:fillClrLst>
     <dgm:linClrLst meth="repeat">
       <a:schemeClr val="lt1"/>
@@ -426,8 +412,8 @@
     <dgm:txEffectClrLst/>
   </dgm:styleLbl>
   <dgm:styleLbl name="asst3">
-    <dgm:fillClrLst>
-      <a:schemeClr val="accent5"/>
+    <dgm:fillClrLst meth="repeat">
+      <a:schemeClr val="accent6"/>
     </dgm:fillClrLst>
     <dgm:linClrLst meth="repeat">
       <a:schemeClr val="lt1"/>
@@ -438,7 +424,7 @@
     <dgm:txEffectClrLst/>
   </dgm:styleLbl>
   <dgm:styleLbl name="asst4">
-    <dgm:fillClrLst>
+    <dgm:fillClrLst meth="repeat">
       <a:schemeClr val="accent6"/>
     </dgm:fillClrLst>
     <dgm:linClrLst meth="repeat">
@@ -451,10 +437,14 @@
   </dgm:styleLbl>
   <dgm:styleLbl name="parChTrans2D1">
     <dgm:fillClrLst meth="repeat">
-      <a:schemeClr val="accent2"/>
+      <a:schemeClr val="accent6">
+        <a:tint val="60000"/>
+      </a:schemeClr>
     </dgm:fillClrLst>
     <dgm:linClrLst meth="repeat">
-      <a:schemeClr val="lt1"/>
+      <a:schemeClr val="accent6">
+        <a:tint val="60000"/>
+      </a:schemeClr>
     </dgm:linClrLst>
     <dgm:effectClrLst/>
     <dgm:txLinClrLst/>
@@ -465,34 +455,38 @@
   </dgm:styleLbl>
   <dgm:styleLbl name="parChTrans2D2">
     <dgm:fillClrLst meth="repeat">
-      <a:schemeClr val="accent3"/>
+      <a:schemeClr val="accent6"/>
     </dgm:fillClrLst>
     <dgm:linClrLst meth="repeat">
-      <a:schemeClr val="lt1"/>
+      <a:schemeClr val="accent6"/>
     </dgm:linClrLst>
     <dgm:effectClrLst/>
     <dgm:txLinClrLst/>
-    <dgm:txFillClrLst/>
+    <dgm:txFillClrLst meth="repeat">
+      <a:schemeClr val="lt1"/>
+    </dgm:txFillClrLst>
     <dgm:txEffectClrLst/>
   </dgm:styleLbl>
   <dgm:styleLbl name="parChTrans2D3">
     <dgm:fillClrLst meth="repeat">
-      <a:schemeClr val="accent4"/>
+      <a:schemeClr val="accent6"/>
     </dgm:fillClrLst>
     <dgm:linClrLst meth="repeat">
-      <a:schemeClr val="lt1"/>
+      <a:schemeClr val="accent6"/>
     </dgm:linClrLst>
     <dgm:effectClrLst/>
     <dgm:txLinClrLst/>
-    <dgm:txFillClrLst/>
+    <dgm:txFillClrLst meth="repeat">
+      <a:schemeClr val="lt1"/>
+    </dgm:txFillClrLst>
     <dgm:txEffectClrLst/>
   </dgm:styleLbl>
   <dgm:styleLbl name="parChTrans2D4">
     <dgm:fillClrLst meth="repeat">
-      <a:schemeClr val="accent5"/>
+      <a:schemeClr val="accent6"/>
     </dgm:fillClrLst>
     <dgm:linClrLst meth="repeat">
-      <a:schemeClr val="lt1"/>
+      <a:schemeClr val="accent6"/>
     </dgm:linClrLst>
     <dgm:effectClrLst/>
     <dgm:txLinClrLst/>
@@ -503,10 +497,12 @@
   </dgm:styleLbl>
   <dgm:styleLbl name="parChTrans1D1">
     <dgm:fillClrLst meth="repeat">
-      <a:schemeClr val="accent2"/>
+      <a:schemeClr val="accent6"/>
     </dgm:fillClrLst>
     <dgm:linClrLst meth="repeat">
-      <a:schemeClr val="accent2"/>
+      <a:schemeClr val="accent6">
+        <a:shade val="60000"/>
+      </a:schemeClr>
     </dgm:linClrLst>
     <dgm:effectClrLst/>
     <dgm:txLinClrLst/>
@@ -517,12 +513,12 @@
   </dgm:styleLbl>
   <dgm:styleLbl name="parChTrans1D2">
     <dgm:fillClrLst meth="repeat">
-      <a:schemeClr val="accent2">
-        <a:tint val="90000"/>
-      </a:schemeClr>
+      <a:schemeClr val="accent6"/>
     </dgm:fillClrLst>
     <dgm:linClrLst meth="repeat">
-      <a:schemeClr val="accent3"/>
+      <a:schemeClr val="accent6">
+        <a:shade val="60000"/>
+      </a:schemeClr>
     </dgm:linClrLst>
     <dgm:effectClrLst/>
     <dgm:txLinClrLst/>
@@ -533,12 +529,12 @@
   </dgm:styleLbl>
   <dgm:styleLbl name="parChTrans1D3">
     <dgm:fillClrLst meth="repeat">
-      <a:schemeClr val="accent2">
-        <a:tint val="70000"/>
-      </a:schemeClr>
+      <a:schemeClr val="accent6"/>
     </dgm:fillClrLst>
     <dgm:linClrLst meth="repeat">
-      <a:schemeClr val="accent4"/>
+      <a:schemeClr val="accent6">
+        <a:shade val="80000"/>
+      </a:schemeClr>
     </dgm:linClrLst>
     <dgm:effectClrLst/>
     <dgm:txLinClrLst/>
@@ -549,12 +545,12 @@
   </dgm:styleLbl>
   <dgm:styleLbl name="parChTrans1D4">
     <dgm:fillClrLst meth="repeat">
-      <a:schemeClr val="accent2">
-        <a:tint val="50000"/>
-      </a:schemeClr>
+      <a:schemeClr val="accent6"/>
     </dgm:fillClrLst>
     <dgm:linClrLst meth="repeat">
-      <a:schemeClr val="accent5"/>
+      <a:schemeClr val="accent6">
+        <a:shade val="80000"/>
+      </a:schemeClr>
     </dgm:linClrLst>
     <dgm:effectClrLst/>
     <dgm:txLinClrLst/>
@@ -569,9 +565,8 @@
         <a:alpha val="90000"/>
       </a:schemeClr>
     </dgm:fillClrLst>
-    <dgm:linClrLst>
-      <a:schemeClr val="accent2"/>
-      <a:schemeClr val="accent3"/>
+    <dgm:linClrLst meth="repeat">
+      <a:schemeClr val="accent6"/>
     </dgm:linClrLst>
     <dgm:effectClrLst/>
     <dgm:txLinClrLst/>
@@ -586,9 +581,8 @@
         <a:alpha val="90000"/>
       </a:schemeClr>
     </dgm:fillClrLst>
-    <dgm:linClrLst>
-      <a:schemeClr val="accent2"/>
-      <a:schemeClr val="accent3"/>
+    <dgm:linClrLst meth="repeat">
+      <a:schemeClr val="accent6"/>
     </dgm:linClrLst>
     <dgm:effectClrLst/>
     <dgm:txLinClrLst/>
@@ -603,9 +597,8 @@
         <a:alpha val="90000"/>
       </a:schemeClr>
     </dgm:fillClrLst>
-    <dgm:linClrLst>
-      <a:schemeClr val="accent2"/>
-      <a:schemeClr val="accent3"/>
+    <dgm:linClrLst meth="repeat">
+      <a:schemeClr val="accent6"/>
     </dgm:linClrLst>
     <dgm:effectClrLst/>
     <dgm:txLinClrLst/>
@@ -621,7 +614,7 @@
       </a:schemeClr>
     </dgm:fillClrLst>
     <dgm:linClrLst meth="repeat">
-      <a:schemeClr val="accent2"/>
+      <a:schemeClr val="accent6"/>
     </dgm:linClrLst>
     <dgm:effectClrLst/>
     <dgm:txLinClrLst/>
@@ -636,9 +629,8 @@
         <a:alpha val="90000"/>
       </a:schemeClr>
     </dgm:fillClrLst>
-    <dgm:linClrLst>
-      <a:schemeClr val="accent2"/>
-      <a:schemeClr val="accent3"/>
+    <dgm:linClrLst meth="repeat">
+      <a:schemeClr val="accent6"/>
     </dgm:linClrLst>
     <dgm:effectClrLst/>
     <dgm:txLinClrLst/>
@@ -651,9 +643,8 @@
     <dgm:fillClrLst meth="repeat">
       <a:schemeClr val="lt1"/>
     </dgm:fillClrLst>
-    <dgm:linClrLst>
-      <a:schemeClr val="accent2"/>
-      <a:schemeClr val="accent3"/>
+    <dgm:linClrLst meth="repeat">
+      <a:schemeClr val="accent6"/>
     </dgm:linClrLst>
     <dgm:effectClrLst/>
     <dgm:txLinClrLst/>
@@ -666,9 +657,8 @@
     <dgm:fillClrLst meth="repeat">
       <a:schemeClr val="lt1"/>
     </dgm:fillClrLst>
-    <dgm:linClrLst>
-      <a:schemeClr val="accent2"/>
-      <a:schemeClr val="accent3"/>
+    <dgm:linClrLst meth="repeat">
+      <a:schemeClr val="accent6"/>
     </dgm:linClrLst>
     <dgm:effectClrLst/>
     <dgm:txLinClrLst/>
@@ -681,9 +671,8 @@
     <dgm:fillClrLst meth="repeat">
       <a:schemeClr val="lt1"/>
     </dgm:fillClrLst>
-    <dgm:linClrLst>
-      <a:schemeClr val="accent2"/>
-      <a:schemeClr val="accent3"/>
+    <dgm:linClrLst meth="repeat">
+      <a:schemeClr val="accent6"/>
     </dgm:linClrLst>
     <dgm:effectClrLst/>
     <dgm:txLinClrLst/>
@@ -693,24 +682,16 @@
     <dgm:txEffectClrLst/>
   </dgm:styleLbl>
   <dgm:styleLbl name="fgAccFollowNode1">
-    <dgm:fillClrLst>
-      <a:schemeClr val="accent2">
+    <dgm:fillClrLst meth="repeat">
+      <a:schemeClr val="accent6">
+        <a:alpha val="90000"/>
         <a:tint val="40000"/>
-        <a:alpha val="90000"/>
-      </a:schemeClr>
-      <a:schemeClr val="accent3">
-        <a:tint val="40000"/>
-        <a:alpha val="90000"/>
       </a:schemeClr>
     </dgm:fillClrLst>
-    <dgm:linClrLst>
-      <a:schemeClr val="accent2">
+    <dgm:linClrLst meth="repeat">
+      <a:schemeClr val="accent6">
+        <a:alpha val="90000"/>
         <a:tint val="40000"/>
-        <a:alpha val="90000"/>
-      </a:schemeClr>
-      <a:schemeClr val="accent3">
-        <a:tint val="40000"/>
-        <a:alpha val="90000"/>
       </a:schemeClr>
     </dgm:linClrLst>
     <dgm:effectClrLst/>
@@ -721,24 +702,16 @@
     <dgm:txEffectClrLst/>
   </dgm:styleLbl>
   <dgm:styleLbl name="alignAccFollowNode1">
-    <dgm:fillClrLst>
-      <a:schemeClr val="accent2">
+    <dgm:fillClrLst meth="repeat">
+      <a:schemeClr val="accent6">
+        <a:alpha val="90000"/>
         <a:tint val="40000"/>
-        <a:alpha val="90000"/>
-      </a:schemeClr>
-      <a:schemeClr val="accent3">
-        <a:tint val="40000"/>
-        <a:alpha val="90000"/>
       </a:schemeClr>
     </dgm:fillClrLst>
-    <dgm:linClrLst>
-      <a:schemeClr val="accent2">
+    <dgm:linClrLst meth="repeat">
+      <a:schemeClr val="accent6">
+        <a:alpha val="90000"/>
         <a:tint val="40000"/>
-        <a:alpha val="90000"/>
-      </a:schemeClr>
-      <a:schemeClr val="accent3">
-        <a:tint val="40000"/>
-        <a:alpha val="90000"/>
       </a:schemeClr>
     </dgm:linClrLst>
     <dgm:effectClrLst/>
@@ -749,24 +722,16 @@
     <dgm:txEffectClrLst/>
   </dgm:styleLbl>
   <dgm:styleLbl name="bgAccFollowNode1">
-    <dgm:fillClrLst>
-      <a:schemeClr val="accent2">
+    <dgm:fillClrLst meth="repeat">
+      <a:schemeClr val="accent6">
+        <a:alpha val="90000"/>
         <a:tint val="40000"/>
-        <a:alpha val="90000"/>
-      </a:schemeClr>
-      <a:schemeClr val="accent3">
-        <a:tint val="40000"/>
-        <a:alpha val="90000"/>
       </a:schemeClr>
     </dgm:fillClrLst>
-    <dgm:linClrLst>
-      <a:schemeClr val="accent2">
+    <dgm:linClrLst meth="repeat">
+      <a:schemeClr val="accent6">
+        <a:alpha val="90000"/>
         <a:tint val="40000"/>
-        <a:alpha val="90000"/>
-      </a:schemeClr>
-      <a:schemeClr val="accent3">
-        <a:tint val="40000"/>
-        <a:alpha val="90000"/>
       </a:schemeClr>
     </dgm:linClrLst>
     <dgm:effectClrLst/>
@@ -782,8 +747,8 @@
         <a:alpha val="90000"/>
       </a:schemeClr>
     </dgm:fillClrLst>
-    <dgm:linClrLst>
-      <a:schemeClr val="accent1"/>
+    <dgm:linClrLst meth="repeat">
+      <a:schemeClr val="accent6"/>
     </dgm:linClrLst>
     <dgm:effectClrLst/>
     <dgm:txLinClrLst/>
@@ -798,8 +763,8 @@
         <a:alpha val="90000"/>
       </a:schemeClr>
     </dgm:fillClrLst>
-    <dgm:linClrLst>
-      <a:schemeClr val="accent3"/>
+    <dgm:linClrLst meth="repeat">
+      <a:schemeClr val="accent6"/>
     </dgm:linClrLst>
     <dgm:effectClrLst/>
     <dgm:txLinClrLst/>
@@ -814,8 +779,8 @@
         <a:alpha val="90000"/>
       </a:schemeClr>
     </dgm:fillClrLst>
-    <dgm:linClrLst>
-      <a:schemeClr val="accent4"/>
+    <dgm:linClrLst meth="repeat">
+      <a:schemeClr val="accent6"/>
     </dgm:linClrLst>
     <dgm:effectClrLst/>
     <dgm:txLinClrLst/>
@@ -830,8 +795,8 @@
         <a:alpha val="90000"/>
       </a:schemeClr>
     </dgm:fillClrLst>
-    <dgm:linClrLst>
-      <a:schemeClr val="accent5"/>
+    <dgm:linClrLst meth="repeat">
+      <a:schemeClr val="accent6"/>
     </dgm:linClrLst>
     <dgm:effectClrLst/>
     <dgm:txLinClrLst/>
@@ -842,12 +807,12 @@
   </dgm:styleLbl>
   <dgm:styleLbl name="bgShp">
     <dgm:fillClrLst meth="repeat">
-      <a:schemeClr val="accent2">
+      <a:schemeClr val="accent6">
         <a:tint val="40000"/>
       </a:schemeClr>
     </dgm:fillClrLst>
     <dgm:linClrLst meth="repeat">
-      <a:schemeClr val="dk1"/>
+      <a:schemeClr val="accent6"/>
     </dgm:linClrLst>
     <dgm:effectClrLst/>
     <dgm:txLinClrLst/>
@@ -858,12 +823,12 @@
   </dgm:styleLbl>
   <dgm:styleLbl name="dkBgShp">
     <dgm:fillClrLst meth="repeat">
-      <a:schemeClr val="accent2">
-        <a:shade val="90000"/>
+      <a:schemeClr val="accent6">
+        <a:shade val="80000"/>
       </a:schemeClr>
     </dgm:fillClrLst>
     <dgm:linClrLst meth="repeat">
-      <a:schemeClr val="dk1"/>
+      <a:schemeClr val="accent6"/>
     </dgm:linClrLst>
     <dgm:effectClrLst/>
     <dgm:txLinClrLst/>
@@ -874,13 +839,13 @@
   </dgm:styleLbl>
   <dgm:styleLbl name="trBgShp">
     <dgm:fillClrLst meth="repeat">
-      <a:schemeClr val="accent2">
+      <a:schemeClr val="accent6">
         <a:tint val="50000"/>
         <a:alpha val="40000"/>
       </a:schemeClr>
     </dgm:fillClrLst>
     <dgm:linClrLst meth="repeat">
-      <a:schemeClr val="accent2"/>
+      <a:schemeClr val="accent6"/>
     </dgm:linClrLst>
     <dgm:effectClrLst/>
     <dgm:txLinClrLst/>
@@ -891,8 +856,8 @@
   </dgm:styleLbl>
   <dgm:styleLbl name="fgShp">
     <dgm:fillClrLst meth="repeat">
-      <a:schemeClr val="accent2">
-        <a:tint val="40000"/>
+      <a:schemeClr val="accent6">
+        <a:tint val="60000"/>
       </a:schemeClr>
     </dgm:fillClrLst>
     <dgm:linClrLst meth="repeat">
@@ -930,7 +895,7 @@
 <dgm:dataModel xmlns:dgm="http://schemas.openxmlformats.org/drawingml/2006/diagram" xmlns:a="http://schemas.openxmlformats.org/drawingml/2006/main">
   <dgm:ptLst>
     <dgm:pt modelId="{A293AA11-2BDA-41BC-A5A5-C7A250F96A07}" type="doc">
-      <dgm:prSet loTypeId="urn:microsoft.com/office/officeart/2008/layout/LinedList" loCatId="list" qsTypeId="urn:microsoft.com/office/officeart/2005/8/quickstyle/simple4" qsCatId="simple" csTypeId="urn:microsoft.com/office/officeart/2005/8/colors/colorful2" csCatId="colorful" phldr="1"/>
+      <dgm:prSet loTypeId="urn:microsoft.com/office/officeart/2008/layout/LinedList" loCatId="list" qsTypeId="urn:microsoft.com/office/officeart/2005/8/quickstyle/simple5" qsCatId="simple" csTypeId="urn:microsoft.com/office/officeart/2005/8/colors/accent6_2" csCatId="accent6" phldr="1"/>
       <dgm:spPr/>
       <dgm:t>
         <a:bodyPr/>
@@ -1139,10 +1104,38 @@
         <a:lstStyle/>
         <a:p>
           <a:r>
-            <a:rPr lang="pl-PL"/>
-            <a:t>DTO-based contract distribution and testing</a:t>
+            <a:rPr lang="pl-PL" dirty="0"/>
+            <a:t>DTO-</a:t>
           </a:r>
-          <a:endParaRPr lang="en-US"/>
+          <a:r>
+            <a:rPr lang="pl-PL" dirty="0" err="1"/>
+            <a:t>based</a:t>
+          </a:r>
+          <a:r>
+            <a:rPr lang="pl-PL" dirty="0"/>
+            <a:t> </a:t>
+          </a:r>
+          <a:r>
+            <a:rPr lang="pl-PL" dirty="0" err="1"/>
+            <a:t>contract</a:t>
+          </a:r>
+          <a:r>
+            <a:rPr lang="pl-PL" dirty="0"/>
+            <a:t> </a:t>
+          </a:r>
+          <a:r>
+            <a:rPr lang="pl-PL" dirty="0" err="1"/>
+            <a:t>distribution</a:t>
+          </a:r>
+          <a:r>
+            <a:rPr lang="pl-PL" dirty="0"/>
+            <a:t> and </a:t>
+          </a:r>
+          <a:r>
+            <a:rPr lang="pl-PL" dirty="0" err="1"/>
+            <a:t>testing</a:t>
+          </a:r>
+          <a:endParaRPr lang="en-US" dirty="0"/>
         </a:p>
       </dgm:t>
     </dgm:pt>
@@ -1176,10 +1169,34 @@
         <a:lstStyle/>
         <a:p>
           <a:r>
-            <a:rPr lang="pl-PL"/>
-            <a:t>OpenAPI contract distribution and testing</a:t>
+            <a:rPr lang="pl-PL" dirty="0" err="1"/>
+            <a:t>OpenAPI</a:t>
           </a:r>
-          <a:endParaRPr lang="en-US"/>
+          <a:r>
+            <a:rPr lang="pl-PL" dirty="0"/>
+            <a:t> </a:t>
+          </a:r>
+          <a:r>
+            <a:rPr lang="pl-PL" dirty="0" err="1"/>
+            <a:t>contract</a:t>
+          </a:r>
+          <a:r>
+            <a:rPr lang="pl-PL" dirty="0"/>
+            <a:t> </a:t>
+          </a:r>
+          <a:r>
+            <a:rPr lang="pl-PL" dirty="0" err="1"/>
+            <a:t>distribution</a:t>
+          </a:r>
+          <a:r>
+            <a:rPr lang="pl-PL" dirty="0"/>
+            <a:t> and </a:t>
+          </a:r>
+          <a:r>
+            <a:rPr lang="pl-PL" dirty="0" err="1"/>
+            <a:t>testing</a:t>
+          </a:r>
+          <a:endParaRPr lang="en-US" dirty="0"/>
         </a:p>
       </dgm:t>
     </dgm:pt>
@@ -1213,10 +1230,22 @@
         <a:lstStyle/>
         <a:p>
           <a:r>
-            <a:rPr lang="pl-PL"/>
-            <a:t>Special service dependency considerations</a:t>
+            <a:rPr lang="pl-PL" dirty="0"/>
+            <a:t>Special service </a:t>
           </a:r>
-          <a:endParaRPr lang="en-US"/>
+          <a:r>
+            <a:rPr lang="pl-PL" dirty="0" err="1"/>
+            <a:t>dependency</a:t>
+          </a:r>
+          <a:r>
+            <a:rPr lang="pl-PL" dirty="0"/>
+            <a:t> </a:t>
+          </a:r>
+          <a:r>
+            <a:rPr lang="pl-PL" dirty="0" err="1"/>
+            <a:t>considerations</a:t>
+          </a:r>
+          <a:endParaRPr lang="en-US" dirty="0"/>
         </a:p>
       </dgm:t>
     </dgm:pt>
@@ -1250,10 +1279,22 @@
         <a:lstStyle/>
         <a:p>
           <a:r>
-            <a:rPr lang="pl-PL"/>
-            <a:t>Non-REST contract distribution</a:t>
+            <a:rPr lang="pl-PL" dirty="0"/>
+            <a:t>Non-REST </a:t>
           </a:r>
-          <a:endParaRPr lang="en-US"/>
+          <a:r>
+            <a:rPr lang="pl-PL" dirty="0" err="1"/>
+            <a:t>contract</a:t>
+          </a:r>
+          <a:r>
+            <a:rPr lang="pl-PL" dirty="0"/>
+            <a:t> </a:t>
+          </a:r>
+          <a:r>
+            <a:rPr lang="pl-PL" dirty="0" err="1"/>
+            <a:t>distribution</a:t>
+          </a:r>
+          <a:endParaRPr lang="en-US" dirty="0"/>
         </a:p>
       </dgm:t>
     </dgm:pt>
@@ -1287,10 +1328,10 @@
         <a:lstStyle/>
         <a:p>
           <a:r>
-            <a:rPr lang="pl-PL"/>
+            <a:rPr lang="pl-PL" dirty="0" err="1"/>
             <a:t>Questions</a:t>
           </a:r>
-          <a:endParaRPr lang="en-US"/>
+          <a:endParaRPr lang="en-US" dirty="0"/>
         </a:p>
       </dgm:t>
     </dgm:pt>
@@ -1316,7 +1357,7 @@
         </a:p>
       </dgm:t>
     </dgm:pt>
-    <dgm:pt modelId="{B6497B14-D0F0-4D79-B9BF-930BAD80E0C7}" type="pres">
+    <dgm:pt modelId="{BC8A8586-C522-4DFD-B76D-AD66DBD9381B}" type="pres">
       <dgm:prSet presAssocID="{A293AA11-2BDA-41BC-A5A5-C7A250F96A07}" presName="vert0" presStyleCnt="0">
         <dgm:presLayoutVars>
           <dgm:dir/>
@@ -1326,185 +1367,185 @@
       </dgm:prSet>
       <dgm:spPr/>
     </dgm:pt>
-    <dgm:pt modelId="{3A1C2ADD-E07B-4E4F-A4B6-6CA3049CDF58}" type="pres">
+    <dgm:pt modelId="{7CA89772-E760-44B9-9320-B4E1B5CC0A8D}" type="pres">
       <dgm:prSet presAssocID="{CA043E4C-5128-4A94-B842-576BC9F45DE5}" presName="thickLine" presStyleLbl="alignNode1" presStyleIdx="0" presStyleCnt="8"/>
       <dgm:spPr/>
     </dgm:pt>
-    <dgm:pt modelId="{D2131C78-C293-4870-8E99-1E6E564690A7}" type="pres">
+    <dgm:pt modelId="{1E132022-35CC-4454-B9ED-81CC25E1F183}" type="pres">
       <dgm:prSet presAssocID="{CA043E4C-5128-4A94-B842-576BC9F45DE5}" presName="horz1" presStyleCnt="0"/>
       <dgm:spPr/>
     </dgm:pt>
-    <dgm:pt modelId="{791433EB-D82E-409F-B4A6-37D22ED4898A}" type="pres">
+    <dgm:pt modelId="{803DFEEC-B050-4A83-9EDE-8DDBD5AF2944}" type="pres">
       <dgm:prSet presAssocID="{CA043E4C-5128-4A94-B842-576BC9F45DE5}" presName="tx1" presStyleLbl="revTx" presStyleIdx="0" presStyleCnt="8"/>
       <dgm:spPr/>
     </dgm:pt>
-    <dgm:pt modelId="{1D073527-CC45-4777-8CAF-103626C14F33}" type="pres">
+    <dgm:pt modelId="{5EDAA324-34D7-4794-A6A7-FD9C59FF7E31}" type="pres">
       <dgm:prSet presAssocID="{CA043E4C-5128-4A94-B842-576BC9F45DE5}" presName="vert1" presStyleCnt="0"/>
       <dgm:spPr/>
     </dgm:pt>
-    <dgm:pt modelId="{C11A21AF-FF47-4A73-B4A6-9B39F1994EFD}" type="pres">
+    <dgm:pt modelId="{A6ACE0CA-D592-436D-A2EB-2C834813328D}" type="pres">
       <dgm:prSet presAssocID="{8A63E69D-C3C6-40F0-A131-C585E4B61481}" presName="thickLine" presStyleLbl="alignNode1" presStyleIdx="1" presStyleCnt="8"/>
       <dgm:spPr/>
     </dgm:pt>
-    <dgm:pt modelId="{5A2314ED-C2A9-4381-8CCA-37FD16486F15}" type="pres">
+    <dgm:pt modelId="{D6F988B2-76D4-4271-B674-6EF1F4682AD8}" type="pres">
       <dgm:prSet presAssocID="{8A63E69D-C3C6-40F0-A131-C585E4B61481}" presName="horz1" presStyleCnt="0"/>
       <dgm:spPr/>
     </dgm:pt>
-    <dgm:pt modelId="{F882112B-266C-4114-99A9-43B9FBF778BA}" type="pres">
+    <dgm:pt modelId="{82BA063E-7CEF-419F-AFF1-F9A8FDA85C82}" type="pres">
       <dgm:prSet presAssocID="{8A63E69D-C3C6-40F0-A131-C585E4B61481}" presName="tx1" presStyleLbl="revTx" presStyleIdx="1" presStyleCnt="8"/>
       <dgm:spPr/>
     </dgm:pt>
-    <dgm:pt modelId="{5230D7D6-A6FD-4F4B-B54A-806CC6AA9783}" type="pres">
+    <dgm:pt modelId="{FA58D983-720A-483C-96FD-A2058A5068EC}" type="pres">
       <dgm:prSet presAssocID="{8A63E69D-C3C6-40F0-A131-C585E4B61481}" presName="vert1" presStyleCnt="0"/>
       <dgm:spPr/>
     </dgm:pt>
-    <dgm:pt modelId="{A392502F-668E-495C-87BC-77382F376A80}" type="pres">
+    <dgm:pt modelId="{2C8382F4-2D66-47A3-994B-D3FAF9814337}" type="pres">
       <dgm:prSet presAssocID="{443AD337-21D2-45FA-A5EE-94441A7D53D9}" presName="thickLine" presStyleLbl="alignNode1" presStyleIdx="2" presStyleCnt="8"/>
       <dgm:spPr/>
     </dgm:pt>
-    <dgm:pt modelId="{AF418682-6955-45D3-8767-999FDCABF73B}" type="pres">
+    <dgm:pt modelId="{9816B161-C9BC-4CA4-8D07-D64E5A0A0DD8}" type="pres">
       <dgm:prSet presAssocID="{443AD337-21D2-45FA-A5EE-94441A7D53D9}" presName="horz1" presStyleCnt="0"/>
       <dgm:spPr/>
     </dgm:pt>
-    <dgm:pt modelId="{3341AE32-ED46-4909-B611-B97B55C1C46F}" type="pres">
+    <dgm:pt modelId="{7DA7CBEB-FE7A-42BF-98EE-7C2901C0392F}" type="pres">
       <dgm:prSet presAssocID="{443AD337-21D2-45FA-A5EE-94441A7D53D9}" presName="tx1" presStyleLbl="revTx" presStyleIdx="2" presStyleCnt="8"/>
       <dgm:spPr/>
     </dgm:pt>
-    <dgm:pt modelId="{D4C265E5-E798-450A-9DD1-8553FCC65E98}" type="pres">
+    <dgm:pt modelId="{9A0AFC91-3497-4794-8D73-C8F033FB985F}" type="pres">
       <dgm:prSet presAssocID="{443AD337-21D2-45FA-A5EE-94441A7D53D9}" presName="vert1" presStyleCnt="0"/>
       <dgm:spPr/>
     </dgm:pt>
-    <dgm:pt modelId="{A5483D8F-5696-45AE-B76B-AE85C036FB4F}" type="pres">
+    <dgm:pt modelId="{8F9BFD17-F2CA-409E-AB27-BEB826AE6E92}" type="pres">
       <dgm:prSet presAssocID="{55D2F2E5-1EF8-4DC0-8F01-23C7AB31DF28}" presName="thickLine" presStyleLbl="alignNode1" presStyleIdx="3" presStyleCnt="8"/>
       <dgm:spPr/>
     </dgm:pt>
-    <dgm:pt modelId="{D717065B-0F83-4F4E-9ABD-430B33926980}" type="pres">
+    <dgm:pt modelId="{E26261E6-8C25-40A3-8643-67772E29A6B6}" type="pres">
       <dgm:prSet presAssocID="{55D2F2E5-1EF8-4DC0-8F01-23C7AB31DF28}" presName="horz1" presStyleCnt="0"/>
       <dgm:spPr/>
     </dgm:pt>
-    <dgm:pt modelId="{BE25C85F-1928-4E32-8A76-2318E833AFD1}" type="pres">
+    <dgm:pt modelId="{6CDFEA12-501B-47D1-A238-E16641500848}" type="pres">
       <dgm:prSet presAssocID="{55D2F2E5-1EF8-4DC0-8F01-23C7AB31DF28}" presName="tx1" presStyleLbl="revTx" presStyleIdx="3" presStyleCnt="8"/>
       <dgm:spPr/>
     </dgm:pt>
-    <dgm:pt modelId="{004251F7-A96A-489E-AA37-E72908EC261C}" type="pres">
+    <dgm:pt modelId="{FA37E2C4-6CEA-490F-8D77-13E7E3472BAC}" type="pres">
       <dgm:prSet presAssocID="{55D2F2E5-1EF8-4DC0-8F01-23C7AB31DF28}" presName="vert1" presStyleCnt="0"/>
       <dgm:spPr/>
     </dgm:pt>
-    <dgm:pt modelId="{2A91D265-EB60-4839-97E1-9AA488EA30C9}" type="pres">
+    <dgm:pt modelId="{9F587D63-3FA5-4DBA-9358-6E8280B0A899}" type="pres">
       <dgm:prSet presAssocID="{1BEA2836-562F-4D2C-AD8D-9803C71A0FC3}" presName="thickLine" presStyleLbl="alignNode1" presStyleIdx="4" presStyleCnt="8"/>
       <dgm:spPr/>
     </dgm:pt>
-    <dgm:pt modelId="{D0CBCEDF-8082-431C-A1BC-6B71A27EA7E6}" type="pres">
+    <dgm:pt modelId="{5DA6EB40-44FE-46BB-9866-B25D39547200}" type="pres">
       <dgm:prSet presAssocID="{1BEA2836-562F-4D2C-AD8D-9803C71A0FC3}" presName="horz1" presStyleCnt="0"/>
       <dgm:spPr/>
     </dgm:pt>
-    <dgm:pt modelId="{58D49E44-B802-4068-A5A6-B8D92FCBD73D}" type="pres">
+    <dgm:pt modelId="{7D4D26FA-0AA0-40FB-8AD5-BE3961E89C2F}" type="pres">
       <dgm:prSet presAssocID="{1BEA2836-562F-4D2C-AD8D-9803C71A0FC3}" presName="tx1" presStyleLbl="revTx" presStyleIdx="4" presStyleCnt="8"/>
       <dgm:spPr/>
     </dgm:pt>
-    <dgm:pt modelId="{9D950C70-0448-41CD-8542-05914837E522}" type="pres">
+    <dgm:pt modelId="{C924D7D7-C080-4382-81EE-6C472126E715}" type="pres">
       <dgm:prSet presAssocID="{1BEA2836-562F-4D2C-AD8D-9803C71A0FC3}" presName="vert1" presStyleCnt="0"/>
       <dgm:spPr/>
     </dgm:pt>
-    <dgm:pt modelId="{26C37521-C4B8-45A3-9CF4-60AA2F47B390}" type="pres">
+    <dgm:pt modelId="{9DABA41B-051B-44E8-B5B7-6BB556C2463F}" type="pres">
       <dgm:prSet presAssocID="{BAF86DD5-4441-4649-A527-F5A271ED7207}" presName="thickLine" presStyleLbl="alignNode1" presStyleIdx="5" presStyleCnt="8"/>
       <dgm:spPr/>
     </dgm:pt>
-    <dgm:pt modelId="{724D07F2-C356-4F76-BF11-D10BA38F7B85}" type="pres">
+    <dgm:pt modelId="{8C95D378-F3A2-4BB4-98D9-0002FBCD22A4}" type="pres">
       <dgm:prSet presAssocID="{BAF86DD5-4441-4649-A527-F5A271ED7207}" presName="horz1" presStyleCnt="0"/>
       <dgm:spPr/>
     </dgm:pt>
-    <dgm:pt modelId="{702A8ECA-5490-43A4-B5D7-71B908B075F6}" type="pres">
+    <dgm:pt modelId="{3EDE19F7-785B-46C9-867B-20365497F041}" type="pres">
       <dgm:prSet presAssocID="{BAF86DD5-4441-4649-A527-F5A271ED7207}" presName="tx1" presStyleLbl="revTx" presStyleIdx="5" presStyleCnt="8"/>
       <dgm:spPr/>
     </dgm:pt>
-    <dgm:pt modelId="{89C37912-17D9-4A01-816F-B5DC03B0F126}" type="pres">
+    <dgm:pt modelId="{640D77B9-8250-4095-BCCF-CBE174348BF9}" type="pres">
       <dgm:prSet presAssocID="{BAF86DD5-4441-4649-A527-F5A271ED7207}" presName="vert1" presStyleCnt="0"/>
       <dgm:spPr/>
     </dgm:pt>
-    <dgm:pt modelId="{CD1E4688-FEDC-4C75-B49B-50FAB344E5B5}" type="pres">
+    <dgm:pt modelId="{B75637E6-9869-47DC-8A6F-4C125967AF15}" type="pres">
       <dgm:prSet presAssocID="{1373AD0D-4D44-4008-9478-F9673084F9D9}" presName="thickLine" presStyleLbl="alignNode1" presStyleIdx="6" presStyleCnt="8"/>
       <dgm:spPr/>
     </dgm:pt>
-    <dgm:pt modelId="{FB5E02B1-6CC1-462B-85D1-89E6813BADDD}" type="pres">
+    <dgm:pt modelId="{0F3D1175-2464-4AC5-87FB-A002E4F0E012}" type="pres">
       <dgm:prSet presAssocID="{1373AD0D-4D44-4008-9478-F9673084F9D9}" presName="horz1" presStyleCnt="0"/>
       <dgm:spPr/>
     </dgm:pt>
-    <dgm:pt modelId="{8F900130-C9A3-4D7C-AA17-34733A33081B}" type="pres">
+    <dgm:pt modelId="{9BCB3BE5-8B53-4F87-9641-BEA6D100A0C0}" type="pres">
       <dgm:prSet presAssocID="{1373AD0D-4D44-4008-9478-F9673084F9D9}" presName="tx1" presStyleLbl="revTx" presStyleIdx="6" presStyleCnt="8"/>
       <dgm:spPr/>
     </dgm:pt>
-    <dgm:pt modelId="{65394C4B-FE56-4088-9DE7-88F685270F1B}" type="pres">
+    <dgm:pt modelId="{7D6F5F32-4AAF-4B8E-B4DA-9C22D789A0DF}" type="pres">
       <dgm:prSet presAssocID="{1373AD0D-4D44-4008-9478-F9673084F9D9}" presName="vert1" presStyleCnt="0"/>
       <dgm:spPr/>
     </dgm:pt>
-    <dgm:pt modelId="{DFC0BD0F-665D-466C-A8B1-57D9A424B7B3}" type="pres">
+    <dgm:pt modelId="{92C3B48E-1071-4772-B1F6-8414AE145A1C}" type="pres">
       <dgm:prSet presAssocID="{89828050-C15A-44D1-8038-6AD2B614E94A}" presName="thickLine" presStyleLbl="alignNode1" presStyleIdx="7" presStyleCnt="8"/>
       <dgm:spPr/>
     </dgm:pt>
-    <dgm:pt modelId="{405DC3D7-DC13-48C9-B2A7-A9D1F287F85C}" type="pres">
+    <dgm:pt modelId="{A6B2601D-D24B-40B5-B040-36D37AFE56DA}" type="pres">
       <dgm:prSet presAssocID="{89828050-C15A-44D1-8038-6AD2B614E94A}" presName="horz1" presStyleCnt="0"/>
       <dgm:spPr/>
     </dgm:pt>
-    <dgm:pt modelId="{1C20CB16-9D30-4D8A-AFB9-87A5A7E59224}" type="pres">
+    <dgm:pt modelId="{03AB9369-BB9C-4D58-96F0-F7EF9250FF4B}" type="pres">
       <dgm:prSet presAssocID="{89828050-C15A-44D1-8038-6AD2B614E94A}" presName="tx1" presStyleLbl="revTx" presStyleIdx="7" presStyleCnt="8"/>
       <dgm:spPr/>
     </dgm:pt>
-    <dgm:pt modelId="{5B9D7F78-E596-48F1-8D49-4404ACBB9BED}" type="pres">
+    <dgm:pt modelId="{81324EA6-D5E0-4AB2-9AEF-2311340583D7}" type="pres">
       <dgm:prSet presAssocID="{89828050-C15A-44D1-8038-6AD2B614E94A}" presName="vert1" presStyleCnt="0"/>
       <dgm:spPr/>
     </dgm:pt>
   </dgm:ptLst>
   <dgm:cxnLst>
     <dgm:cxn modelId="{0824E506-1803-46C8-AD24-FCBCC09A47C4}" srcId="{A293AA11-2BDA-41BC-A5A5-C7A250F96A07}" destId="{1BEA2836-562F-4D2C-AD8D-9803C71A0FC3}" srcOrd="4" destOrd="0" parTransId="{C44CE668-319B-4016-88FB-81CA489F0373}" sibTransId="{A9B10EBA-1643-4E98-9D31-F0351A802409}"/>
-    <dgm:cxn modelId="{EE803914-2159-482A-8046-C96F5D1D0F04}" type="presOf" srcId="{1BEA2836-562F-4D2C-AD8D-9803C71A0FC3}" destId="{58D49E44-B802-4068-A5A6-B8D92FCBD73D}" srcOrd="0" destOrd="0" presId="urn:microsoft.com/office/officeart/2008/layout/LinedList"/>
+    <dgm:cxn modelId="{C3801A12-7330-4D30-B607-F104EE216B9E}" type="presOf" srcId="{A293AA11-2BDA-41BC-A5A5-C7A250F96A07}" destId="{BC8A8586-C522-4DFD-B76D-AD66DBD9381B}" srcOrd="0" destOrd="0" presId="urn:microsoft.com/office/officeart/2008/layout/LinedList"/>
     <dgm:cxn modelId="{4199E818-930F-4BF3-90CD-227FE4E65DF5}" srcId="{A293AA11-2BDA-41BC-A5A5-C7A250F96A07}" destId="{443AD337-21D2-45FA-A5EE-94441A7D53D9}" srcOrd="2" destOrd="0" parTransId="{74804A30-4F24-4793-A4AA-61A00ECE091C}" sibTransId="{7D2E0245-16AB-49A9-99A1-C6904E97D539}"/>
     <dgm:cxn modelId="{662A6F21-E1AC-4B48-B13A-2E0E1B9AA290}" srcId="{A293AA11-2BDA-41BC-A5A5-C7A250F96A07}" destId="{89828050-C15A-44D1-8038-6AD2B614E94A}" srcOrd="7" destOrd="0" parTransId="{D7A6BF53-8E6A-439E-99F4-284E9A9E10C4}" sibTransId="{DD72FBE6-A2B8-478C-B168-FE963A90CEB5}"/>
-    <dgm:cxn modelId="{C2E86E32-0FB5-42C2-9F30-98819237933F}" type="presOf" srcId="{55D2F2E5-1EF8-4DC0-8F01-23C7AB31DF28}" destId="{BE25C85F-1928-4E32-8A76-2318E833AFD1}" srcOrd="0" destOrd="0" presId="urn:microsoft.com/office/officeart/2008/layout/LinedList"/>
+    <dgm:cxn modelId="{9DCB6F21-607F-43EA-B002-9BE1336FADDE}" type="presOf" srcId="{55D2F2E5-1EF8-4DC0-8F01-23C7AB31DF28}" destId="{6CDFEA12-501B-47D1-A238-E16641500848}" srcOrd="0" destOrd="0" presId="urn:microsoft.com/office/officeart/2008/layout/LinedList"/>
+    <dgm:cxn modelId="{6F2C133C-393F-40E6-94FF-FB7BB9EF3143}" type="presOf" srcId="{1BEA2836-562F-4D2C-AD8D-9803C71A0FC3}" destId="{7D4D26FA-0AA0-40FB-8AD5-BE3961E89C2F}" srcOrd="0" destOrd="0" presId="urn:microsoft.com/office/officeart/2008/layout/LinedList"/>
     <dgm:cxn modelId="{C7845B62-CBEB-4D34-982A-0D6E39C19F04}" srcId="{A293AA11-2BDA-41BC-A5A5-C7A250F96A07}" destId="{8A63E69D-C3C6-40F0-A131-C585E4B61481}" srcOrd="1" destOrd="0" parTransId="{1AC8CED0-D2C5-4E12-8041-DDD419B68FC6}" sibTransId="{810FF601-7C4E-47F2-8923-8CF080255558}"/>
     <dgm:cxn modelId="{B4DF1C44-D0A0-44E4-B2F3-1FCDAC027CF8}" srcId="{A293AA11-2BDA-41BC-A5A5-C7A250F96A07}" destId="{55D2F2E5-1EF8-4DC0-8F01-23C7AB31DF28}" srcOrd="3" destOrd="0" parTransId="{6CE37031-C455-4AA9-9EEA-93F85C996F5A}" sibTransId="{C84523F8-4796-43BC-BA9C-92F7BF4AD67F}"/>
-    <dgm:cxn modelId="{12A50C73-B22C-4588-8C25-796D077F9F6C}" type="presOf" srcId="{1373AD0D-4D44-4008-9478-F9673084F9D9}" destId="{8F900130-C9A3-4D7C-AA17-34733A33081B}" srcOrd="0" destOrd="0" presId="urn:microsoft.com/office/officeart/2008/layout/LinedList"/>
     <dgm:cxn modelId="{A2323C74-6507-413E-86FD-30F75813255A}" srcId="{A293AA11-2BDA-41BC-A5A5-C7A250F96A07}" destId="{1373AD0D-4D44-4008-9478-F9673084F9D9}" srcOrd="6" destOrd="0" parTransId="{1FC28E7A-B6E5-44F1-B3E5-B019B05CA41B}" sibTransId="{BF5D41E6-6A90-4D2A-97E5-27AC261D4B73}"/>
-    <dgm:cxn modelId="{2B3C0D88-B0BF-45B3-A227-6EC75FD166E1}" type="presOf" srcId="{8A63E69D-C3C6-40F0-A131-C585E4B61481}" destId="{F882112B-266C-4114-99A9-43B9FBF778BA}" srcOrd="0" destOrd="0" presId="urn:microsoft.com/office/officeart/2008/layout/LinedList"/>
+    <dgm:cxn modelId="{7E214E88-3CDE-4330-8355-EF4DAB9F8320}" type="presOf" srcId="{89828050-C15A-44D1-8038-6AD2B614E94A}" destId="{03AB9369-BB9C-4D58-96F0-F7EF9250FF4B}" srcOrd="0" destOrd="0" presId="urn:microsoft.com/office/officeart/2008/layout/LinedList"/>
     <dgm:cxn modelId="{3F851690-49B8-4B6B-8EE0-83D96EA9EA14}" srcId="{A293AA11-2BDA-41BC-A5A5-C7A250F96A07}" destId="{CA043E4C-5128-4A94-B842-576BC9F45DE5}" srcOrd="0" destOrd="0" parTransId="{B2BBE951-568B-4962-B760-AF13A29EAA89}" sibTransId="{1E578BA6-7A1D-454E-B89C-4D6431BC6A04}"/>
-    <dgm:cxn modelId="{5F7D7E94-AEDE-4FCF-8AE8-65F17AF11A15}" type="presOf" srcId="{CA043E4C-5128-4A94-B842-576BC9F45DE5}" destId="{791433EB-D82E-409F-B4A6-37D22ED4898A}" srcOrd="0" destOrd="0" presId="urn:microsoft.com/office/officeart/2008/layout/LinedList"/>
     <dgm:cxn modelId="{7C316D9D-6619-400C-99A9-60799172C6B8}" srcId="{A293AA11-2BDA-41BC-A5A5-C7A250F96A07}" destId="{BAF86DD5-4441-4649-A527-F5A271ED7207}" srcOrd="5" destOrd="0" parTransId="{24247150-21BE-435F-9952-4D2E1B3AD563}" sibTransId="{71CD1296-72E0-4E92-A7C3-C92E920AC60E}"/>
-    <dgm:cxn modelId="{F772FEC9-028B-495E-ADDC-D6A80CC7D50E}" type="presOf" srcId="{BAF86DD5-4441-4649-A527-F5A271ED7207}" destId="{702A8ECA-5490-43A4-B5D7-71B908B075F6}" srcOrd="0" destOrd="0" presId="urn:microsoft.com/office/officeart/2008/layout/LinedList"/>
-    <dgm:cxn modelId="{2E342EE6-7785-4E7E-8889-816F4B495AF6}" type="presOf" srcId="{A293AA11-2BDA-41BC-A5A5-C7A250F96A07}" destId="{B6497B14-D0F0-4D79-B9BF-930BAD80E0C7}" srcOrd="0" destOrd="0" presId="urn:microsoft.com/office/officeart/2008/layout/LinedList"/>
-    <dgm:cxn modelId="{C0390FFC-5C0F-4440-A1F1-2FE573238C4C}" type="presOf" srcId="{443AD337-21D2-45FA-A5EE-94441A7D53D9}" destId="{3341AE32-ED46-4909-B611-B97B55C1C46F}" srcOrd="0" destOrd="0" presId="urn:microsoft.com/office/officeart/2008/layout/LinedList"/>
-    <dgm:cxn modelId="{4957B0FD-C43C-4EC0-9E6F-60ADF703CA07}" type="presOf" srcId="{89828050-C15A-44D1-8038-6AD2B614E94A}" destId="{1C20CB16-9D30-4D8A-AFB9-87A5A7E59224}" srcOrd="0" destOrd="0" presId="urn:microsoft.com/office/officeart/2008/layout/LinedList"/>
-    <dgm:cxn modelId="{A267FCED-31F9-420E-AC46-302157AB02E9}" type="presParOf" srcId="{B6497B14-D0F0-4D79-B9BF-930BAD80E0C7}" destId="{3A1C2ADD-E07B-4E4F-A4B6-6CA3049CDF58}" srcOrd="0" destOrd="0" presId="urn:microsoft.com/office/officeart/2008/layout/LinedList"/>
-    <dgm:cxn modelId="{B1795323-EA12-46C6-898F-52034443F988}" type="presParOf" srcId="{B6497B14-D0F0-4D79-B9BF-930BAD80E0C7}" destId="{D2131C78-C293-4870-8E99-1E6E564690A7}" srcOrd="1" destOrd="0" presId="urn:microsoft.com/office/officeart/2008/layout/LinedList"/>
-    <dgm:cxn modelId="{7BB1E85D-1476-4072-87E3-87B07036CFEE}" type="presParOf" srcId="{D2131C78-C293-4870-8E99-1E6E564690A7}" destId="{791433EB-D82E-409F-B4A6-37D22ED4898A}" srcOrd="0" destOrd="0" presId="urn:microsoft.com/office/officeart/2008/layout/LinedList"/>
-    <dgm:cxn modelId="{377F38D3-40CA-41BC-9154-567E3F452860}" type="presParOf" srcId="{D2131C78-C293-4870-8E99-1E6E564690A7}" destId="{1D073527-CC45-4777-8CAF-103626C14F33}" srcOrd="1" destOrd="0" presId="urn:microsoft.com/office/officeart/2008/layout/LinedList"/>
-    <dgm:cxn modelId="{0B0E697C-381B-4FB8-AAFD-3091389C5BF8}" type="presParOf" srcId="{B6497B14-D0F0-4D79-B9BF-930BAD80E0C7}" destId="{C11A21AF-FF47-4A73-B4A6-9B39F1994EFD}" srcOrd="2" destOrd="0" presId="urn:microsoft.com/office/officeart/2008/layout/LinedList"/>
-    <dgm:cxn modelId="{21092081-CE56-4C67-A7B2-7360FC6FF115}" type="presParOf" srcId="{B6497B14-D0F0-4D79-B9BF-930BAD80E0C7}" destId="{5A2314ED-C2A9-4381-8CCA-37FD16486F15}" srcOrd="3" destOrd="0" presId="urn:microsoft.com/office/officeart/2008/layout/LinedList"/>
-    <dgm:cxn modelId="{4B1983AF-F253-441C-88A1-EBF134FE01BE}" type="presParOf" srcId="{5A2314ED-C2A9-4381-8CCA-37FD16486F15}" destId="{F882112B-266C-4114-99A9-43B9FBF778BA}" srcOrd="0" destOrd="0" presId="urn:microsoft.com/office/officeart/2008/layout/LinedList"/>
-    <dgm:cxn modelId="{28565979-5CED-4BC4-A070-ADA28B4EBADB}" type="presParOf" srcId="{5A2314ED-C2A9-4381-8CCA-37FD16486F15}" destId="{5230D7D6-A6FD-4F4B-B54A-806CC6AA9783}" srcOrd="1" destOrd="0" presId="urn:microsoft.com/office/officeart/2008/layout/LinedList"/>
-    <dgm:cxn modelId="{7C6C173B-9E3E-4623-AA63-45AFF8AF674C}" type="presParOf" srcId="{B6497B14-D0F0-4D79-B9BF-930BAD80E0C7}" destId="{A392502F-668E-495C-87BC-77382F376A80}" srcOrd="4" destOrd="0" presId="urn:microsoft.com/office/officeart/2008/layout/LinedList"/>
-    <dgm:cxn modelId="{610933EB-7871-4FF8-821D-512BB32FCDFB}" type="presParOf" srcId="{B6497B14-D0F0-4D79-B9BF-930BAD80E0C7}" destId="{AF418682-6955-45D3-8767-999FDCABF73B}" srcOrd="5" destOrd="0" presId="urn:microsoft.com/office/officeart/2008/layout/LinedList"/>
-    <dgm:cxn modelId="{5F2CCF03-AF1B-4395-A0F9-7ABD842B27DC}" type="presParOf" srcId="{AF418682-6955-45D3-8767-999FDCABF73B}" destId="{3341AE32-ED46-4909-B611-B97B55C1C46F}" srcOrd="0" destOrd="0" presId="urn:microsoft.com/office/officeart/2008/layout/LinedList"/>
-    <dgm:cxn modelId="{C443F982-00C0-4F88-8DC0-BCC0E1690489}" type="presParOf" srcId="{AF418682-6955-45D3-8767-999FDCABF73B}" destId="{D4C265E5-E798-450A-9DD1-8553FCC65E98}" srcOrd="1" destOrd="0" presId="urn:microsoft.com/office/officeart/2008/layout/LinedList"/>
-    <dgm:cxn modelId="{781E0A30-B6F4-4020-97D4-733683000341}" type="presParOf" srcId="{B6497B14-D0F0-4D79-B9BF-930BAD80E0C7}" destId="{A5483D8F-5696-45AE-B76B-AE85C036FB4F}" srcOrd="6" destOrd="0" presId="urn:microsoft.com/office/officeart/2008/layout/LinedList"/>
-    <dgm:cxn modelId="{0CD059E8-F80E-476B-A2BF-6528A5DC30F2}" type="presParOf" srcId="{B6497B14-D0F0-4D79-B9BF-930BAD80E0C7}" destId="{D717065B-0F83-4F4E-9ABD-430B33926980}" srcOrd="7" destOrd="0" presId="urn:microsoft.com/office/officeart/2008/layout/LinedList"/>
-    <dgm:cxn modelId="{265663DC-6558-490A-A663-751CC8CEED9D}" type="presParOf" srcId="{D717065B-0F83-4F4E-9ABD-430B33926980}" destId="{BE25C85F-1928-4E32-8A76-2318E833AFD1}" srcOrd="0" destOrd="0" presId="urn:microsoft.com/office/officeart/2008/layout/LinedList"/>
-    <dgm:cxn modelId="{D85EAC73-E5D4-480B-B24F-7F1494451804}" type="presParOf" srcId="{D717065B-0F83-4F4E-9ABD-430B33926980}" destId="{004251F7-A96A-489E-AA37-E72908EC261C}" srcOrd="1" destOrd="0" presId="urn:microsoft.com/office/officeart/2008/layout/LinedList"/>
-    <dgm:cxn modelId="{356EEB06-6A96-43E6-8C00-7A5E01B40079}" type="presParOf" srcId="{B6497B14-D0F0-4D79-B9BF-930BAD80E0C7}" destId="{2A91D265-EB60-4839-97E1-9AA488EA30C9}" srcOrd="8" destOrd="0" presId="urn:microsoft.com/office/officeart/2008/layout/LinedList"/>
-    <dgm:cxn modelId="{5A5FFCDD-C5E4-436F-A207-5CC82DCD57AA}" type="presParOf" srcId="{B6497B14-D0F0-4D79-B9BF-930BAD80E0C7}" destId="{D0CBCEDF-8082-431C-A1BC-6B71A27EA7E6}" srcOrd="9" destOrd="0" presId="urn:microsoft.com/office/officeart/2008/layout/LinedList"/>
-    <dgm:cxn modelId="{BC51E0EC-D792-428D-829D-3229B83FB402}" type="presParOf" srcId="{D0CBCEDF-8082-431C-A1BC-6B71A27EA7E6}" destId="{58D49E44-B802-4068-A5A6-B8D92FCBD73D}" srcOrd="0" destOrd="0" presId="urn:microsoft.com/office/officeart/2008/layout/LinedList"/>
-    <dgm:cxn modelId="{A23A2E20-F64D-436F-B7DD-90034777B889}" type="presParOf" srcId="{D0CBCEDF-8082-431C-A1BC-6B71A27EA7E6}" destId="{9D950C70-0448-41CD-8542-05914837E522}" srcOrd="1" destOrd="0" presId="urn:microsoft.com/office/officeart/2008/layout/LinedList"/>
-    <dgm:cxn modelId="{5D399A66-6333-4CA4-BC7C-32025371E029}" type="presParOf" srcId="{B6497B14-D0F0-4D79-B9BF-930BAD80E0C7}" destId="{26C37521-C4B8-45A3-9CF4-60AA2F47B390}" srcOrd="10" destOrd="0" presId="urn:microsoft.com/office/officeart/2008/layout/LinedList"/>
-    <dgm:cxn modelId="{8EB51B03-730D-4384-94C5-25FC5830F1A6}" type="presParOf" srcId="{B6497B14-D0F0-4D79-B9BF-930BAD80E0C7}" destId="{724D07F2-C356-4F76-BF11-D10BA38F7B85}" srcOrd="11" destOrd="0" presId="urn:microsoft.com/office/officeart/2008/layout/LinedList"/>
-    <dgm:cxn modelId="{D0801ED9-286D-49B1-AC9E-CCB8AACA0E97}" type="presParOf" srcId="{724D07F2-C356-4F76-BF11-D10BA38F7B85}" destId="{702A8ECA-5490-43A4-B5D7-71B908B075F6}" srcOrd="0" destOrd="0" presId="urn:microsoft.com/office/officeart/2008/layout/LinedList"/>
-    <dgm:cxn modelId="{F0A7AF7A-F903-4CB7-8AF7-E6C70A7258E4}" type="presParOf" srcId="{724D07F2-C356-4F76-BF11-D10BA38F7B85}" destId="{89C37912-17D9-4A01-816F-B5DC03B0F126}" srcOrd="1" destOrd="0" presId="urn:microsoft.com/office/officeart/2008/layout/LinedList"/>
-    <dgm:cxn modelId="{CEE5DAD1-573A-427A-B92B-3FC8C7C95311}" type="presParOf" srcId="{B6497B14-D0F0-4D79-B9BF-930BAD80E0C7}" destId="{CD1E4688-FEDC-4C75-B49B-50FAB344E5B5}" srcOrd="12" destOrd="0" presId="urn:microsoft.com/office/officeart/2008/layout/LinedList"/>
-    <dgm:cxn modelId="{EF2329C7-849F-41D8-AA60-D8D5667677BF}" type="presParOf" srcId="{B6497B14-D0F0-4D79-B9BF-930BAD80E0C7}" destId="{FB5E02B1-6CC1-462B-85D1-89E6813BADDD}" srcOrd="13" destOrd="0" presId="urn:microsoft.com/office/officeart/2008/layout/LinedList"/>
-    <dgm:cxn modelId="{8ED3F789-8691-4DB3-9FF6-5CEADF1FE8D9}" type="presParOf" srcId="{FB5E02B1-6CC1-462B-85D1-89E6813BADDD}" destId="{8F900130-C9A3-4D7C-AA17-34733A33081B}" srcOrd="0" destOrd="0" presId="urn:microsoft.com/office/officeart/2008/layout/LinedList"/>
-    <dgm:cxn modelId="{392E00F9-5798-44E1-9CCA-A04074A11012}" type="presParOf" srcId="{FB5E02B1-6CC1-462B-85D1-89E6813BADDD}" destId="{65394C4B-FE56-4088-9DE7-88F685270F1B}" srcOrd="1" destOrd="0" presId="urn:microsoft.com/office/officeart/2008/layout/LinedList"/>
-    <dgm:cxn modelId="{2AF261BA-1DEA-4DB9-A805-82EDAF9C165C}" type="presParOf" srcId="{B6497B14-D0F0-4D79-B9BF-930BAD80E0C7}" destId="{DFC0BD0F-665D-466C-A8B1-57D9A424B7B3}" srcOrd="14" destOrd="0" presId="urn:microsoft.com/office/officeart/2008/layout/LinedList"/>
-    <dgm:cxn modelId="{0AA499F9-C84C-4EF0-8BC8-A70183A5D66F}" type="presParOf" srcId="{B6497B14-D0F0-4D79-B9BF-930BAD80E0C7}" destId="{405DC3D7-DC13-48C9-B2A7-A9D1F287F85C}" srcOrd="15" destOrd="0" presId="urn:microsoft.com/office/officeart/2008/layout/LinedList"/>
-    <dgm:cxn modelId="{A4B984CD-9334-4589-B656-E3B56DC71E98}" type="presParOf" srcId="{405DC3D7-DC13-48C9-B2A7-A9D1F287F85C}" destId="{1C20CB16-9D30-4D8A-AFB9-87A5A7E59224}" srcOrd="0" destOrd="0" presId="urn:microsoft.com/office/officeart/2008/layout/LinedList"/>
-    <dgm:cxn modelId="{848FA365-B1E2-426A-B691-C963F26A0E01}" type="presParOf" srcId="{405DC3D7-DC13-48C9-B2A7-A9D1F287F85C}" destId="{5B9D7F78-E596-48F1-8D49-4404ACBB9BED}" srcOrd="1" destOrd="0" presId="urn:microsoft.com/office/officeart/2008/layout/LinedList"/>
+    <dgm:cxn modelId="{6974D8A7-CA22-4CB5-8DF0-D822B7D106B1}" type="presOf" srcId="{BAF86DD5-4441-4649-A527-F5A271ED7207}" destId="{3EDE19F7-785B-46C9-867B-20365497F041}" srcOrd="0" destOrd="0" presId="urn:microsoft.com/office/officeart/2008/layout/LinedList"/>
+    <dgm:cxn modelId="{9A45DFBE-0136-4803-A697-AB3F7DD094D6}" type="presOf" srcId="{443AD337-21D2-45FA-A5EE-94441A7D53D9}" destId="{7DA7CBEB-FE7A-42BF-98EE-7C2901C0392F}" srcOrd="0" destOrd="0" presId="urn:microsoft.com/office/officeart/2008/layout/LinedList"/>
+    <dgm:cxn modelId="{AD8568C1-3B78-45F5-97F0-443B6CE0364B}" type="presOf" srcId="{8A63E69D-C3C6-40F0-A131-C585E4B61481}" destId="{82BA063E-7CEF-419F-AFF1-F9A8FDA85C82}" srcOrd="0" destOrd="0" presId="urn:microsoft.com/office/officeart/2008/layout/LinedList"/>
+    <dgm:cxn modelId="{B1A4FDE4-1601-41D0-A88D-04D1C548945C}" type="presOf" srcId="{1373AD0D-4D44-4008-9478-F9673084F9D9}" destId="{9BCB3BE5-8B53-4F87-9641-BEA6D100A0C0}" srcOrd="0" destOrd="0" presId="urn:microsoft.com/office/officeart/2008/layout/LinedList"/>
+    <dgm:cxn modelId="{F4CFE5FD-8AE0-4779-9AAA-01B6F28DF203}" type="presOf" srcId="{CA043E4C-5128-4A94-B842-576BC9F45DE5}" destId="{803DFEEC-B050-4A83-9EDE-8DDBD5AF2944}" srcOrd="0" destOrd="0" presId="urn:microsoft.com/office/officeart/2008/layout/LinedList"/>
+    <dgm:cxn modelId="{401D2E23-C7A1-405F-AA06-DDA530970192}" type="presParOf" srcId="{BC8A8586-C522-4DFD-B76D-AD66DBD9381B}" destId="{7CA89772-E760-44B9-9320-B4E1B5CC0A8D}" srcOrd="0" destOrd="0" presId="urn:microsoft.com/office/officeart/2008/layout/LinedList"/>
+    <dgm:cxn modelId="{65FF9E0E-2BDF-4E7A-816A-E5442456DAE3}" type="presParOf" srcId="{BC8A8586-C522-4DFD-B76D-AD66DBD9381B}" destId="{1E132022-35CC-4454-B9ED-81CC25E1F183}" srcOrd="1" destOrd="0" presId="urn:microsoft.com/office/officeart/2008/layout/LinedList"/>
+    <dgm:cxn modelId="{B1E142F0-B793-4783-82A9-462471AB0968}" type="presParOf" srcId="{1E132022-35CC-4454-B9ED-81CC25E1F183}" destId="{803DFEEC-B050-4A83-9EDE-8DDBD5AF2944}" srcOrd="0" destOrd="0" presId="urn:microsoft.com/office/officeart/2008/layout/LinedList"/>
+    <dgm:cxn modelId="{A19F7586-895F-49FD-8236-3A2554C87811}" type="presParOf" srcId="{1E132022-35CC-4454-B9ED-81CC25E1F183}" destId="{5EDAA324-34D7-4794-A6A7-FD9C59FF7E31}" srcOrd="1" destOrd="0" presId="urn:microsoft.com/office/officeart/2008/layout/LinedList"/>
+    <dgm:cxn modelId="{D4A9DCC5-3F7B-4D51-BF08-EBCFF0FADC0A}" type="presParOf" srcId="{BC8A8586-C522-4DFD-B76D-AD66DBD9381B}" destId="{A6ACE0CA-D592-436D-A2EB-2C834813328D}" srcOrd="2" destOrd="0" presId="urn:microsoft.com/office/officeart/2008/layout/LinedList"/>
+    <dgm:cxn modelId="{2FBBAEFC-1DEA-4EC9-88D5-DFB2B347E90C}" type="presParOf" srcId="{BC8A8586-C522-4DFD-B76D-AD66DBD9381B}" destId="{D6F988B2-76D4-4271-B674-6EF1F4682AD8}" srcOrd="3" destOrd="0" presId="urn:microsoft.com/office/officeart/2008/layout/LinedList"/>
+    <dgm:cxn modelId="{FBA9069F-138C-4655-B159-40D2EF9E8CBF}" type="presParOf" srcId="{D6F988B2-76D4-4271-B674-6EF1F4682AD8}" destId="{82BA063E-7CEF-419F-AFF1-F9A8FDA85C82}" srcOrd="0" destOrd="0" presId="urn:microsoft.com/office/officeart/2008/layout/LinedList"/>
+    <dgm:cxn modelId="{31C28076-6EE9-4F5F-89AC-4D817FC66F25}" type="presParOf" srcId="{D6F988B2-76D4-4271-B674-6EF1F4682AD8}" destId="{FA58D983-720A-483C-96FD-A2058A5068EC}" srcOrd="1" destOrd="0" presId="urn:microsoft.com/office/officeart/2008/layout/LinedList"/>
+    <dgm:cxn modelId="{CE7297B8-8A4D-49D7-B65E-31468B673A98}" type="presParOf" srcId="{BC8A8586-C522-4DFD-B76D-AD66DBD9381B}" destId="{2C8382F4-2D66-47A3-994B-D3FAF9814337}" srcOrd="4" destOrd="0" presId="urn:microsoft.com/office/officeart/2008/layout/LinedList"/>
+    <dgm:cxn modelId="{3655C396-58BA-49DD-9311-7304DA06691F}" type="presParOf" srcId="{BC8A8586-C522-4DFD-B76D-AD66DBD9381B}" destId="{9816B161-C9BC-4CA4-8D07-D64E5A0A0DD8}" srcOrd="5" destOrd="0" presId="urn:microsoft.com/office/officeart/2008/layout/LinedList"/>
+    <dgm:cxn modelId="{0CAB4C22-2DD7-4645-A730-A265A49CDBF8}" type="presParOf" srcId="{9816B161-C9BC-4CA4-8D07-D64E5A0A0DD8}" destId="{7DA7CBEB-FE7A-42BF-98EE-7C2901C0392F}" srcOrd="0" destOrd="0" presId="urn:microsoft.com/office/officeart/2008/layout/LinedList"/>
+    <dgm:cxn modelId="{CAEFD251-90A8-4124-8E79-2E6B97985BD2}" type="presParOf" srcId="{9816B161-C9BC-4CA4-8D07-D64E5A0A0DD8}" destId="{9A0AFC91-3497-4794-8D73-C8F033FB985F}" srcOrd="1" destOrd="0" presId="urn:microsoft.com/office/officeart/2008/layout/LinedList"/>
+    <dgm:cxn modelId="{7174CAD4-515D-4632-A97B-0577BC118257}" type="presParOf" srcId="{BC8A8586-C522-4DFD-B76D-AD66DBD9381B}" destId="{8F9BFD17-F2CA-409E-AB27-BEB826AE6E92}" srcOrd="6" destOrd="0" presId="urn:microsoft.com/office/officeart/2008/layout/LinedList"/>
+    <dgm:cxn modelId="{3427CF6B-17E0-4428-A8AA-1C30AAB7485B}" type="presParOf" srcId="{BC8A8586-C522-4DFD-B76D-AD66DBD9381B}" destId="{E26261E6-8C25-40A3-8643-67772E29A6B6}" srcOrd="7" destOrd="0" presId="urn:microsoft.com/office/officeart/2008/layout/LinedList"/>
+    <dgm:cxn modelId="{16F318BC-1C88-4032-8EAD-DF98EA78388B}" type="presParOf" srcId="{E26261E6-8C25-40A3-8643-67772E29A6B6}" destId="{6CDFEA12-501B-47D1-A238-E16641500848}" srcOrd="0" destOrd="0" presId="urn:microsoft.com/office/officeart/2008/layout/LinedList"/>
+    <dgm:cxn modelId="{CBEA64BB-CD08-410C-827E-30D0F638111B}" type="presParOf" srcId="{E26261E6-8C25-40A3-8643-67772E29A6B6}" destId="{FA37E2C4-6CEA-490F-8D77-13E7E3472BAC}" srcOrd="1" destOrd="0" presId="urn:microsoft.com/office/officeart/2008/layout/LinedList"/>
+    <dgm:cxn modelId="{756F46B6-C46E-4904-BFD2-577E5436D8AF}" type="presParOf" srcId="{BC8A8586-C522-4DFD-B76D-AD66DBD9381B}" destId="{9F587D63-3FA5-4DBA-9358-6E8280B0A899}" srcOrd="8" destOrd="0" presId="urn:microsoft.com/office/officeart/2008/layout/LinedList"/>
+    <dgm:cxn modelId="{97C253F1-8A34-46D1-881A-39B59F726562}" type="presParOf" srcId="{BC8A8586-C522-4DFD-B76D-AD66DBD9381B}" destId="{5DA6EB40-44FE-46BB-9866-B25D39547200}" srcOrd="9" destOrd="0" presId="urn:microsoft.com/office/officeart/2008/layout/LinedList"/>
+    <dgm:cxn modelId="{F6801FCD-12F9-4FFC-B6B9-FE5F20A91835}" type="presParOf" srcId="{5DA6EB40-44FE-46BB-9866-B25D39547200}" destId="{7D4D26FA-0AA0-40FB-8AD5-BE3961E89C2F}" srcOrd="0" destOrd="0" presId="urn:microsoft.com/office/officeart/2008/layout/LinedList"/>
+    <dgm:cxn modelId="{C5F3C024-45AA-4E32-93CA-1333F07C8796}" type="presParOf" srcId="{5DA6EB40-44FE-46BB-9866-B25D39547200}" destId="{C924D7D7-C080-4382-81EE-6C472126E715}" srcOrd="1" destOrd="0" presId="urn:microsoft.com/office/officeart/2008/layout/LinedList"/>
+    <dgm:cxn modelId="{9BD58422-6E25-4F0E-A439-61DE16D6AD9A}" type="presParOf" srcId="{BC8A8586-C522-4DFD-B76D-AD66DBD9381B}" destId="{9DABA41B-051B-44E8-B5B7-6BB556C2463F}" srcOrd="10" destOrd="0" presId="urn:microsoft.com/office/officeart/2008/layout/LinedList"/>
+    <dgm:cxn modelId="{DFB94C47-337A-4859-90DE-2725B3F66D17}" type="presParOf" srcId="{BC8A8586-C522-4DFD-B76D-AD66DBD9381B}" destId="{8C95D378-F3A2-4BB4-98D9-0002FBCD22A4}" srcOrd="11" destOrd="0" presId="urn:microsoft.com/office/officeart/2008/layout/LinedList"/>
+    <dgm:cxn modelId="{8FBDC0C8-4EAD-47B7-8FA4-88AA0BC4ACA1}" type="presParOf" srcId="{8C95D378-F3A2-4BB4-98D9-0002FBCD22A4}" destId="{3EDE19F7-785B-46C9-867B-20365497F041}" srcOrd="0" destOrd="0" presId="urn:microsoft.com/office/officeart/2008/layout/LinedList"/>
+    <dgm:cxn modelId="{C21C534A-4E83-45B0-AB7D-A7CA35EBB5B7}" type="presParOf" srcId="{8C95D378-F3A2-4BB4-98D9-0002FBCD22A4}" destId="{640D77B9-8250-4095-BCCF-CBE174348BF9}" srcOrd="1" destOrd="0" presId="urn:microsoft.com/office/officeart/2008/layout/LinedList"/>
+    <dgm:cxn modelId="{0823514E-68A9-4B2A-A8FF-3397571C6515}" type="presParOf" srcId="{BC8A8586-C522-4DFD-B76D-AD66DBD9381B}" destId="{B75637E6-9869-47DC-8A6F-4C125967AF15}" srcOrd="12" destOrd="0" presId="urn:microsoft.com/office/officeart/2008/layout/LinedList"/>
+    <dgm:cxn modelId="{A7636BFE-D24B-4F62-BC98-8C69C26D1C46}" type="presParOf" srcId="{BC8A8586-C522-4DFD-B76D-AD66DBD9381B}" destId="{0F3D1175-2464-4AC5-87FB-A002E4F0E012}" srcOrd="13" destOrd="0" presId="urn:microsoft.com/office/officeart/2008/layout/LinedList"/>
+    <dgm:cxn modelId="{7EC756E6-1A74-4FAC-BB86-F4AE66E1D4AD}" type="presParOf" srcId="{0F3D1175-2464-4AC5-87FB-A002E4F0E012}" destId="{9BCB3BE5-8B53-4F87-9641-BEA6D100A0C0}" srcOrd="0" destOrd="0" presId="urn:microsoft.com/office/officeart/2008/layout/LinedList"/>
+    <dgm:cxn modelId="{386B6D7B-87E2-4E7A-89DF-916511E633B7}" type="presParOf" srcId="{0F3D1175-2464-4AC5-87FB-A002E4F0E012}" destId="{7D6F5F32-4AAF-4B8E-B4DA-9C22D789A0DF}" srcOrd="1" destOrd="0" presId="urn:microsoft.com/office/officeart/2008/layout/LinedList"/>
+    <dgm:cxn modelId="{0B7AC3A1-CBCD-45C4-B739-E972ED438EB1}" type="presParOf" srcId="{BC8A8586-C522-4DFD-B76D-AD66DBD9381B}" destId="{92C3B48E-1071-4772-B1F6-8414AE145A1C}" srcOrd="14" destOrd="0" presId="urn:microsoft.com/office/officeart/2008/layout/LinedList"/>
+    <dgm:cxn modelId="{BF24E2F3-E80B-4208-830B-D21E10B31F96}" type="presParOf" srcId="{BC8A8586-C522-4DFD-B76D-AD66DBD9381B}" destId="{A6B2601D-D24B-40B5-B040-36D37AFE56DA}" srcOrd="15" destOrd="0" presId="urn:microsoft.com/office/officeart/2008/layout/LinedList"/>
+    <dgm:cxn modelId="{1982947D-39D7-471D-AB2B-8F9658089620}" type="presParOf" srcId="{A6B2601D-D24B-40B5-B040-36D37AFE56DA}" destId="{03AB9369-BB9C-4D58-96F0-F7EF9250FF4B}" srcOrd="0" destOrd="0" presId="urn:microsoft.com/office/officeart/2008/layout/LinedList"/>
+    <dgm:cxn modelId="{DD0B028B-F809-49C0-B371-4266C54A4D51}" type="presParOf" srcId="{A6B2601D-D24B-40B5-B040-36D37AFE56DA}" destId="{81324EA6-D5E0-4AB2-9AEF-2311340583D7}" srcOrd="1" destOrd="0" presId="urn:microsoft.com/office/officeart/2008/layout/LinedList"/>
   </dgm:cxnLst>
   <dgm:bg/>
   <dgm:whole/>
@@ -1524,7 +1565,7 @@
       <dsp:cNvGrpSpPr/>
     </dsp:nvGrpSpPr>
     <dsp:grpSpPr/>
-    <dsp:sp modelId="{3A1C2ADD-E07B-4E4F-A4B6-6CA3049CDF58}">
+    <dsp:sp modelId="{7CA89772-E760-44B9-9320-B4E1B5CC0A8D}">
       <dsp:nvSpPr>
         <dsp:cNvPr id="0" name=""/>
         <dsp:cNvSpPr/>
@@ -1532,7 +1573,7 @@
       <dsp:spPr>
         <a:xfrm>
           <a:off x="0" y="0"/>
-          <a:ext cx="6912245" cy="0"/>
+          <a:ext cx="10233025" cy="0"/>
         </a:xfrm>
         <a:prstGeom prst="line">
           <a:avLst/>
@@ -1540,7 +1581,7 @@
         <a:gradFill rotWithShape="0">
           <a:gsLst>
             <a:gs pos="0">
-              <a:schemeClr val="accent2">
+              <a:schemeClr val="accent6">
                 <a:hueOff val="0"/>
                 <a:satOff val="0"/>
                 <a:lumOff val="0"/>
@@ -1551,7 +1592,7 @@
               </a:schemeClr>
             </a:gs>
             <a:gs pos="50000">
-              <a:schemeClr val="accent2">
+              <a:schemeClr val="accent6">
                 <a:hueOff val="0"/>
                 <a:satOff val="0"/>
                 <a:lumOff val="0"/>
@@ -1562,7 +1603,7 @@
               </a:schemeClr>
             </a:gs>
             <a:gs pos="100000">
-              <a:schemeClr val="accent2">
+              <a:schemeClr val="accent6">
                 <a:hueOff val="0"/>
                 <a:satOff val="0"/>
                 <a:lumOff val="0"/>
@@ -1577,7 +1618,7 @@
         </a:gradFill>
         <a:ln w="6350" cap="flat" cmpd="sng" algn="ctr">
           <a:solidFill>
-            <a:schemeClr val="accent2">
+            <a:schemeClr val="accent6">
               <a:hueOff val="0"/>
               <a:satOff val="0"/>
               <a:lumOff val="0"/>
@@ -1587,7 +1628,13 @@
           <a:prstDash val="solid"/>
           <a:miter lim="800000"/>
         </a:ln>
-        <a:effectLst/>
+        <a:effectLst>
+          <a:outerShdw blurRad="57150" dist="19050" dir="5400000" algn="ctr" rotWithShape="0">
+            <a:srgbClr val="000000">
+              <a:alpha val="63000"/>
+            </a:srgbClr>
+          </a:outerShdw>
+        </a:effectLst>
       </dsp:spPr>
       <dsp:style>
         <a:lnRef idx="1">
@@ -1596,7 +1643,7 @@
         <a:fillRef idx="3">
           <a:scrgbClr r="0" g="0" b="0"/>
         </a:fillRef>
-        <a:effectRef idx="2">
+        <a:effectRef idx="3">
           <a:scrgbClr r="0" g="0" b="0"/>
         </a:effectRef>
         <a:fontRef idx="minor">
@@ -1604,7 +1651,7 @@
         </a:fontRef>
       </dsp:style>
     </dsp:sp>
-    <dsp:sp modelId="{791433EB-D82E-409F-B4A6-37D22ED4898A}">
+    <dsp:sp modelId="{803DFEEC-B050-4A83-9EDE-8DDBD5AF2944}">
       <dsp:nvSpPr>
         <dsp:cNvPr id="0" name=""/>
         <dsp:cNvSpPr/>
@@ -1612,7 +1659,7 @@
       <dsp:spPr>
         <a:xfrm>
           <a:off x="0" y="0"/>
-          <a:ext cx="6912245" cy="692110"/>
+          <a:ext cx="10233025" cy="543917"/>
         </a:xfrm>
         <a:prstGeom prst="rect">
           <a:avLst/>
@@ -1636,12 +1683,12 @@
         <a:fontRef idx="minor"/>
       </dsp:style>
       <dsp:txBody>
-        <a:bodyPr spcFirstLastPara="0" vert="horz" wrap="square" lIns="99060" tIns="99060" rIns="99060" bIns="99060" numCol="1" spcCol="1270" anchor="t" anchorCtr="0">
+        <a:bodyPr spcFirstLastPara="0" vert="horz" wrap="square" lIns="95250" tIns="95250" rIns="95250" bIns="95250" numCol="1" spcCol="1270" anchor="t" anchorCtr="0">
           <a:noAutofit/>
         </a:bodyPr>
         <a:lstStyle/>
         <a:p>
-          <a:pPr marL="0" lvl="0" indent="0" algn="l" defTabSz="1155700">
+          <a:pPr marL="0" lvl="0" indent="0" algn="l" defTabSz="1111250">
             <a:lnSpc>
               <a:spcPct val="90000"/>
             </a:lnSpc>
@@ -1654,58 +1701,58 @@
             <a:buNone/>
           </a:pPr>
           <a:r>
-            <a:rPr lang="pl-PL" sz="2600" kern="1200" dirty="0" err="1"/>
+            <a:rPr lang="pl-PL" sz="2500" kern="1200" dirty="0" err="1"/>
             <a:t>Why</a:t>
           </a:r>
           <a:r>
-            <a:rPr lang="pl-PL" sz="2600" kern="1200" dirty="0"/>
+            <a:rPr lang="pl-PL" sz="2500" kern="1200" dirty="0"/>
             <a:t> </a:t>
           </a:r>
           <a:r>
-            <a:rPr lang="pl-PL" sz="2600" kern="1200" dirty="0" err="1"/>
+            <a:rPr lang="pl-PL" sz="2500" kern="1200" dirty="0" err="1"/>
             <a:t>contract</a:t>
           </a:r>
           <a:r>
-            <a:rPr lang="pl-PL" sz="2600" kern="1200" dirty="0"/>
+            <a:rPr lang="pl-PL" sz="2500" kern="1200" dirty="0"/>
             <a:t> </a:t>
           </a:r>
           <a:r>
-            <a:rPr lang="pl-PL" sz="2600" kern="1200" dirty="0" err="1"/>
+            <a:rPr lang="pl-PL" sz="2500" kern="1200" dirty="0" err="1"/>
             <a:t>distribution</a:t>
           </a:r>
           <a:r>
-            <a:rPr lang="pl-PL" sz="2600" kern="1200" dirty="0"/>
+            <a:rPr lang="pl-PL" sz="2500" kern="1200" dirty="0"/>
             <a:t> </a:t>
           </a:r>
           <a:r>
-            <a:rPr lang="pl-PL" sz="2600" kern="1200" dirty="0" err="1"/>
+            <a:rPr lang="pl-PL" sz="2500" kern="1200" dirty="0" err="1"/>
             <a:t>is</a:t>
           </a:r>
           <a:r>
-            <a:rPr lang="pl-PL" sz="2600" kern="1200" dirty="0"/>
+            <a:rPr lang="pl-PL" sz="2500" kern="1200" dirty="0"/>
             <a:t> </a:t>
           </a:r>
           <a:r>
-            <a:rPr lang="pl-PL" sz="2600" kern="1200" dirty="0" err="1"/>
+            <a:rPr lang="pl-PL" sz="2500" kern="1200" dirty="0" err="1"/>
             <a:t>important</a:t>
           </a:r>
-          <a:endParaRPr lang="en-US" sz="2600" kern="1200" dirty="0"/>
+          <a:endParaRPr lang="en-US" sz="2500" kern="1200" dirty="0"/>
         </a:p>
       </dsp:txBody>
       <dsp:txXfrm>
         <a:off x="0" y="0"/>
-        <a:ext cx="6912245" cy="692110"/>
+        <a:ext cx="10233025" cy="543917"/>
       </dsp:txXfrm>
     </dsp:sp>
-    <dsp:sp modelId="{C11A21AF-FF47-4A73-B4A6-9B39F1994EFD}">
+    <dsp:sp modelId="{A6ACE0CA-D592-436D-A2EB-2C834813328D}">
       <dsp:nvSpPr>
         <dsp:cNvPr id="0" name=""/>
         <dsp:cNvSpPr/>
       </dsp:nvSpPr>
       <dsp:spPr>
         <a:xfrm>
-          <a:off x="0" y="692110"/>
-          <a:ext cx="6912245" cy="0"/>
+          <a:off x="0" y="543917"/>
+          <a:ext cx="10233025" cy="0"/>
         </a:xfrm>
         <a:prstGeom prst="line">
           <a:avLst/>
@@ -1713,10 +1760,10 @@
         <a:gradFill rotWithShape="0">
           <a:gsLst>
             <a:gs pos="0">
-              <a:schemeClr val="accent2">
-                <a:hueOff val="-730428"/>
-                <a:satOff val="-974"/>
-                <a:lumOff val="-2913"/>
+              <a:schemeClr val="accent6">
+                <a:hueOff val="0"/>
+                <a:satOff val="0"/>
+                <a:lumOff val="0"/>
                 <a:alphaOff val="0"/>
                 <a:satMod val="103000"/>
                 <a:lumMod val="102000"/>
@@ -1724,10 +1771,10 @@
               </a:schemeClr>
             </a:gs>
             <a:gs pos="50000">
-              <a:schemeClr val="accent2">
-                <a:hueOff val="-730428"/>
-                <a:satOff val="-974"/>
-                <a:lumOff val="-2913"/>
+              <a:schemeClr val="accent6">
+                <a:hueOff val="0"/>
+                <a:satOff val="0"/>
+                <a:lumOff val="0"/>
                 <a:alphaOff val="0"/>
                 <a:satMod val="110000"/>
                 <a:lumMod val="100000"/>
@@ -1735,10 +1782,10 @@
               </a:schemeClr>
             </a:gs>
             <a:gs pos="100000">
-              <a:schemeClr val="accent2">
-                <a:hueOff val="-730428"/>
-                <a:satOff val="-974"/>
-                <a:lumOff val="-2913"/>
+              <a:schemeClr val="accent6">
+                <a:hueOff val="0"/>
+                <a:satOff val="0"/>
+                <a:lumOff val="0"/>
                 <a:alphaOff val="0"/>
                 <a:lumMod val="99000"/>
                 <a:satMod val="120000"/>
@@ -1750,17 +1797,23 @@
         </a:gradFill>
         <a:ln w="6350" cap="flat" cmpd="sng" algn="ctr">
           <a:solidFill>
-            <a:schemeClr val="accent2">
-              <a:hueOff val="-730428"/>
-              <a:satOff val="-974"/>
-              <a:lumOff val="-2913"/>
+            <a:schemeClr val="accent6">
+              <a:hueOff val="0"/>
+              <a:satOff val="0"/>
+              <a:lumOff val="0"/>
               <a:alphaOff val="0"/>
             </a:schemeClr>
           </a:solidFill>
           <a:prstDash val="solid"/>
           <a:miter lim="800000"/>
         </a:ln>
-        <a:effectLst/>
+        <a:effectLst>
+          <a:outerShdw blurRad="57150" dist="19050" dir="5400000" algn="ctr" rotWithShape="0">
+            <a:srgbClr val="000000">
+              <a:alpha val="63000"/>
+            </a:srgbClr>
+          </a:outerShdw>
+        </a:effectLst>
       </dsp:spPr>
       <dsp:style>
         <a:lnRef idx="1">
@@ -1769,7 +1822,7 @@
         <a:fillRef idx="3">
           <a:scrgbClr r="0" g="0" b="0"/>
         </a:fillRef>
-        <a:effectRef idx="2">
+        <a:effectRef idx="3">
           <a:scrgbClr r="0" g="0" b="0"/>
         </a:effectRef>
         <a:fontRef idx="minor">
@@ -1777,15 +1830,15 @@
         </a:fontRef>
       </dsp:style>
     </dsp:sp>
-    <dsp:sp modelId="{F882112B-266C-4114-99A9-43B9FBF778BA}">
+    <dsp:sp modelId="{82BA063E-7CEF-419F-AFF1-F9A8FDA85C82}">
       <dsp:nvSpPr>
         <dsp:cNvPr id="0" name=""/>
         <dsp:cNvSpPr/>
       </dsp:nvSpPr>
       <dsp:spPr>
         <a:xfrm>
-          <a:off x="0" y="692110"/>
-          <a:ext cx="6912245" cy="692110"/>
+          <a:off x="0" y="543917"/>
+          <a:ext cx="10233025" cy="543917"/>
         </a:xfrm>
         <a:prstGeom prst="rect">
           <a:avLst/>
@@ -1809,12 +1862,12 @@
         <a:fontRef idx="minor"/>
       </dsp:style>
       <dsp:txBody>
-        <a:bodyPr spcFirstLastPara="0" vert="horz" wrap="square" lIns="99060" tIns="99060" rIns="99060" bIns="99060" numCol="1" spcCol="1270" anchor="t" anchorCtr="0">
+        <a:bodyPr spcFirstLastPara="0" vert="horz" wrap="square" lIns="95250" tIns="95250" rIns="95250" bIns="95250" numCol="1" spcCol="1270" anchor="t" anchorCtr="0">
           <a:noAutofit/>
         </a:bodyPr>
         <a:lstStyle/>
         <a:p>
-          <a:pPr marL="0" lvl="0" indent="0" algn="l" defTabSz="1155700">
+          <a:pPr marL="0" lvl="0" indent="0" algn="l" defTabSz="1111250">
             <a:lnSpc>
               <a:spcPct val="90000"/>
             </a:lnSpc>
@@ -1827,42 +1880,42 @@
             <a:buNone/>
           </a:pPr>
           <a:r>
-            <a:rPr lang="pl-PL" sz="2600" kern="1200" dirty="0" err="1"/>
+            <a:rPr lang="pl-PL" sz="2500" kern="1200" dirty="0" err="1"/>
             <a:t>Differrent</a:t>
           </a:r>
           <a:r>
-            <a:rPr lang="pl-PL" sz="2600" kern="1200" dirty="0"/>
+            <a:rPr lang="pl-PL" sz="2500" kern="1200" dirty="0"/>
             <a:t> </a:t>
           </a:r>
           <a:r>
-            <a:rPr lang="pl-PL" sz="2600" kern="1200" dirty="0" err="1"/>
+            <a:rPr lang="pl-PL" sz="2500" kern="1200" dirty="0" err="1"/>
             <a:t>views</a:t>
           </a:r>
           <a:r>
-            <a:rPr lang="pl-PL" sz="2600" kern="1200" dirty="0"/>
+            <a:rPr lang="pl-PL" sz="2500" kern="1200" dirty="0"/>
             <a:t> on </a:t>
           </a:r>
           <a:r>
-            <a:rPr lang="pl-PL" sz="2600" kern="1200" dirty="0" err="1"/>
+            <a:rPr lang="pl-PL" sz="2500" kern="1200" dirty="0" err="1"/>
             <a:t>tests</a:t>
           </a:r>
-          <a:endParaRPr lang="en-US" sz="2600" kern="1200" dirty="0"/>
+          <a:endParaRPr lang="en-US" sz="2500" kern="1200" dirty="0"/>
         </a:p>
       </dsp:txBody>
       <dsp:txXfrm>
-        <a:off x="0" y="692110"/>
-        <a:ext cx="6912245" cy="692110"/>
+        <a:off x="0" y="543917"/>
+        <a:ext cx="10233025" cy="543917"/>
       </dsp:txXfrm>
     </dsp:sp>
-    <dsp:sp modelId="{A392502F-668E-495C-87BC-77382F376A80}">
+    <dsp:sp modelId="{2C8382F4-2D66-47A3-994B-D3FAF9814337}">
       <dsp:nvSpPr>
         <dsp:cNvPr id="0" name=""/>
         <dsp:cNvSpPr/>
       </dsp:nvSpPr>
       <dsp:spPr>
         <a:xfrm>
-          <a:off x="0" y="1384220"/>
-          <a:ext cx="6912245" cy="0"/>
+          <a:off x="0" y="1087834"/>
+          <a:ext cx="10233025" cy="0"/>
         </a:xfrm>
         <a:prstGeom prst="line">
           <a:avLst/>
@@ -1870,10 +1923,10 @@
         <a:gradFill rotWithShape="0">
           <a:gsLst>
             <a:gs pos="0">
-              <a:schemeClr val="accent2">
-                <a:hueOff val="-1460856"/>
-                <a:satOff val="-1949"/>
-                <a:lumOff val="-5826"/>
+              <a:schemeClr val="accent6">
+                <a:hueOff val="0"/>
+                <a:satOff val="0"/>
+                <a:lumOff val="0"/>
                 <a:alphaOff val="0"/>
                 <a:satMod val="103000"/>
                 <a:lumMod val="102000"/>
@@ -1881,10 +1934,10 @@
               </a:schemeClr>
             </a:gs>
             <a:gs pos="50000">
-              <a:schemeClr val="accent2">
-                <a:hueOff val="-1460856"/>
-                <a:satOff val="-1949"/>
-                <a:lumOff val="-5826"/>
+              <a:schemeClr val="accent6">
+                <a:hueOff val="0"/>
+                <a:satOff val="0"/>
+                <a:lumOff val="0"/>
                 <a:alphaOff val="0"/>
                 <a:satMod val="110000"/>
                 <a:lumMod val="100000"/>
@@ -1892,10 +1945,10 @@
               </a:schemeClr>
             </a:gs>
             <a:gs pos="100000">
-              <a:schemeClr val="accent2">
-                <a:hueOff val="-1460856"/>
-                <a:satOff val="-1949"/>
-                <a:lumOff val="-5826"/>
+              <a:schemeClr val="accent6">
+                <a:hueOff val="0"/>
+                <a:satOff val="0"/>
+                <a:lumOff val="0"/>
                 <a:alphaOff val="0"/>
                 <a:lumMod val="99000"/>
                 <a:satMod val="120000"/>
@@ -1907,17 +1960,23 @@
         </a:gradFill>
         <a:ln w="6350" cap="flat" cmpd="sng" algn="ctr">
           <a:solidFill>
-            <a:schemeClr val="accent2">
-              <a:hueOff val="-1460856"/>
-              <a:satOff val="-1949"/>
-              <a:lumOff val="-5826"/>
+            <a:schemeClr val="accent6">
+              <a:hueOff val="0"/>
+              <a:satOff val="0"/>
+              <a:lumOff val="0"/>
               <a:alphaOff val="0"/>
             </a:schemeClr>
           </a:solidFill>
           <a:prstDash val="solid"/>
           <a:miter lim="800000"/>
         </a:ln>
-        <a:effectLst/>
+        <a:effectLst>
+          <a:outerShdw blurRad="57150" dist="19050" dir="5400000" algn="ctr" rotWithShape="0">
+            <a:srgbClr val="000000">
+              <a:alpha val="63000"/>
+            </a:srgbClr>
+          </a:outerShdw>
+        </a:effectLst>
       </dsp:spPr>
       <dsp:style>
         <a:lnRef idx="1">
@@ -1926,7 +1985,7 @@
         <a:fillRef idx="3">
           <a:scrgbClr r="0" g="0" b="0"/>
         </a:fillRef>
-        <a:effectRef idx="2">
+        <a:effectRef idx="3">
           <a:scrgbClr r="0" g="0" b="0"/>
         </a:effectRef>
         <a:fontRef idx="minor">
@@ -1934,15 +1993,15 @@
         </a:fontRef>
       </dsp:style>
     </dsp:sp>
-    <dsp:sp modelId="{3341AE32-ED46-4909-B611-B97B55C1C46F}">
+    <dsp:sp modelId="{7DA7CBEB-FE7A-42BF-98EE-7C2901C0392F}">
       <dsp:nvSpPr>
         <dsp:cNvPr id="0" name=""/>
         <dsp:cNvSpPr/>
       </dsp:nvSpPr>
       <dsp:spPr>
         <a:xfrm>
-          <a:off x="0" y="1384220"/>
-          <a:ext cx="6912245" cy="692110"/>
+          <a:off x="0" y="1087834"/>
+          <a:ext cx="10233025" cy="543917"/>
         </a:xfrm>
         <a:prstGeom prst="rect">
           <a:avLst/>
@@ -1966,12 +2025,12 @@
         <a:fontRef idx="minor"/>
       </dsp:style>
       <dsp:txBody>
-        <a:bodyPr spcFirstLastPara="0" vert="horz" wrap="square" lIns="99060" tIns="99060" rIns="99060" bIns="99060" numCol="1" spcCol="1270" anchor="t" anchorCtr="0">
+        <a:bodyPr spcFirstLastPara="0" vert="horz" wrap="square" lIns="95250" tIns="95250" rIns="95250" bIns="95250" numCol="1" spcCol="1270" anchor="t" anchorCtr="0">
           <a:noAutofit/>
         </a:bodyPr>
         <a:lstStyle/>
         <a:p>
-          <a:pPr marL="0" lvl="0" indent="0" algn="l" defTabSz="1155700">
+          <a:pPr marL="0" lvl="0" indent="0" algn="l" defTabSz="1111250">
             <a:lnSpc>
               <a:spcPct val="90000"/>
             </a:lnSpc>
@@ -1984,58 +2043,58 @@
             <a:buNone/>
           </a:pPr>
           <a:r>
-            <a:rPr lang="pl-PL" sz="2600" kern="1200" dirty="0"/>
+            <a:rPr lang="pl-PL" sz="2500" kern="1200" dirty="0"/>
             <a:t>Interface-</a:t>
           </a:r>
           <a:r>
-            <a:rPr lang="pl-PL" sz="2600" kern="1200" dirty="0" err="1"/>
+            <a:rPr lang="pl-PL" sz="2500" kern="1200" dirty="0" err="1"/>
             <a:t>based</a:t>
           </a:r>
           <a:r>
-            <a:rPr lang="pl-PL" sz="2600" kern="1200" dirty="0"/>
+            <a:rPr lang="pl-PL" sz="2500" kern="1200" dirty="0"/>
             <a:t> </a:t>
           </a:r>
           <a:r>
-            <a:rPr lang="pl-PL" sz="2600" kern="1200" dirty="0" err="1"/>
+            <a:rPr lang="pl-PL" sz="2500" kern="1200" dirty="0" err="1"/>
             <a:t>contract</a:t>
           </a:r>
           <a:r>
-            <a:rPr lang="pl-PL" sz="2600" kern="1200" dirty="0"/>
+            <a:rPr lang="pl-PL" sz="2500" kern="1200" dirty="0"/>
             <a:t> </a:t>
           </a:r>
           <a:r>
-            <a:rPr lang="pl-PL" sz="2600" kern="1200" dirty="0" err="1"/>
+            <a:rPr lang="pl-PL" sz="2500" kern="1200" dirty="0" err="1"/>
             <a:t>distribution</a:t>
           </a:r>
           <a:r>
-            <a:rPr lang="pl-PL" sz="2600" kern="1200" dirty="0"/>
+            <a:rPr lang="pl-PL" sz="2500" kern="1200" dirty="0"/>
             <a:t> and </a:t>
           </a:r>
           <a:r>
-            <a:rPr lang="pl-PL" sz="2600" kern="1200" dirty="0" err="1"/>
+            <a:rPr lang="pl-PL" sz="2500" kern="1200" dirty="0" err="1"/>
             <a:t>testing</a:t>
           </a:r>
           <a:r>
-            <a:rPr lang="pl-PL" sz="2600" kern="1200" dirty="0"/>
+            <a:rPr lang="pl-PL" sz="2500" kern="1200" dirty="0"/>
             <a:t> </a:t>
           </a:r>
-          <a:endParaRPr lang="en-US" sz="2600" kern="1200" dirty="0"/>
+          <a:endParaRPr lang="en-US" sz="2500" kern="1200" dirty="0"/>
         </a:p>
       </dsp:txBody>
       <dsp:txXfrm>
-        <a:off x="0" y="1384220"/>
-        <a:ext cx="6912245" cy="692110"/>
+        <a:off x="0" y="1087834"/>
+        <a:ext cx="10233025" cy="543917"/>
       </dsp:txXfrm>
     </dsp:sp>
-    <dsp:sp modelId="{A5483D8F-5696-45AE-B76B-AE85C036FB4F}">
+    <dsp:sp modelId="{8F9BFD17-F2CA-409E-AB27-BEB826AE6E92}">
       <dsp:nvSpPr>
         <dsp:cNvPr id="0" name=""/>
         <dsp:cNvSpPr/>
       </dsp:nvSpPr>
       <dsp:spPr>
         <a:xfrm>
-          <a:off x="0" y="2076331"/>
-          <a:ext cx="6912245" cy="0"/>
+          <a:off x="0" y="1631751"/>
+          <a:ext cx="10233025" cy="0"/>
         </a:xfrm>
         <a:prstGeom prst="line">
           <a:avLst/>
@@ -2043,10 +2102,10 @@
         <a:gradFill rotWithShape="0">
           <a:gsLst>
             <a:gs pos="0">
-              <a:schemeClr val="accent2">
-                <a:hueOff val="-2191284"/>
-                <a:satOff val="-2923"/>
-                <a:lumOff val="-8739"/>
+              <a:schemeClr val="accent6">
+                <a:hueOff val="0"/>
+                <a:satOff val="0"/>
+                <a:lumOff val="0"/>
                 <a:alphaOff val="0"/>
                 <a:satMod val="103000"/>
                 <a:lumMod val="102000"/>
@@ -2054,10 +2113,10 @@
               </a:schemeClr>
             </a:gs>
             <a:gs pos="50000">
-              <a:schemeClr val="accent2">
-                <a:hueOff val="-2191284"/>
-                <a:satOff val="-2923"/>
-                <a:lumOff val="-8739"/>
+              <a:schemeClr val="accent6">
+                <a:hueOff val="0"/>
+                <a:satOff val="0"/>
+                <a:lumOff val="0"/>
                 <a:alphaOff val="0"/>
                 <a:satMod val="110000"/>
                 <a:lumMod val="100000"/>
@@ -2065,10 +2124,10 @@
               </a:schemeClr>
             </a:gs>
             <a:gs pos="100000">
-              <a:schemeClr val="accent2">
-                <a:hueOff val="-2191284"/>
-                <a:satOff val="-2923"/>
-                <a:lumOff val="-8739"/>
+              <a:schemeClr val="accent6">
+                <a:hueOff val="0"/>
+                <a:satOff val="0"/>
+                <a:lumOff val="0"/>
                 <a:alphaOff val="0"/>
                 <a:lumMod val="99000"/>
                 <a:satMod val="120000"/>
@@ -2080,17 +2139,23 @@
         </a:gradFill>
         <a:ln w="6350" cap="flat" cmpd="sng" algn="ctr">
           <a:solidFill>
-            <a:schemeClr val="accent2">
-              <a:hueOff val="-2191284"/>
-              <a:satOff val="-2923"/>
-              <a:lumOff val="-8739"/>
+            <a:schemeClr val="accent6">
+              <a:hueOff val="0"/>
+              <a:satOff val="0"/>
+              <a:lumOff val="0"/>
               <a:alphaOff val="0"/>
             </a:schemeClr>
           </a:solidFill>
           <a:prstDash val="solid"/>
           <a:miter lim="800000"/>
         </a:ln>
-        <a:effectLst/>
+        <a:effectLst>
+          <a:outerShdw blurRad="57150" dist="19050" dir="5400000" algn="ctr" rotWithShape="0">
+            <a:srgbClr val="000000">
+              <a:alpha val="63000"/>
+            </a:srgbClr>
+          </a:outerShdw>
+        </a:effectLst>
       </dsp:spPr>
       <dsp:style>
         <a:lnRef idx="1">
@@ -2099,7 +2164,7 @@
         <a:fillRef idx="3">
           <a:scrgbClr r="0" g="0" b="0"/>
         </a:fillRef>
-        <a:effectRef idx="2">
+        <a:effectRef idx="3">
           <a:scrgbClr r="0" g="0" b="0"/>
         </a:effectRef>
         <a:fontRef idx="minor">
@@ -2107,15 +2172,15 @@
         </a:fontRef>
       </dsp:style>
     </dsp:sp>
-    <dsp:sp modelId="{BE25C85F-1928-4E32-8A76-2318E833AFD1}">
+    <dsp:sp modelId="{6CDFEA12-501B-47D1-A238-E16641500848}">
       <dsp:nvSpPr>
         <dsp:cNvPr id="0" name=""/>
         <dsp:cNvSpPr/>
       </dsp:nvSpPr>
       <dsp:spPr>
         <a:xfrm>
-          <a:off x="0" y="2076331"/>
-          <a:ext cx="6912245" cy="692110"/>
+          <a:off x="0" y="1631751"/>
+          <a:ext cx="10233025" cy="543917"/>
         </a:xfrm>
         <a:prstGeom prst="rect">
           <a:avLst/>
@@ -2139,12 +2204,12 @@
         <a:fontRef idx="minor"/>
       </dsp:style>
       <dsp:txBody>
-        <a:bodyPr spcFirstLastPara="0" vert="horz" wrap="square" lIns="99060" tIns="99060" rIns="99060" bIns="99060" numCol="1" spcCol="1270" anchor="t" anchorCtr="0">
+        <a:bodyPr spcFirstLastPara="0" vert="horz" wrap="square" lIns="95250" tIns="95250" rIns="95250" bIns="95250" numCol="1" spcCol="1270" anchor="t" anchorCtr="0">
           <a:noAutofit/>
         </a:bodyPr>
         <a:lstStyle/>
         <a:p>
-          <a:pPr marL="0" lvl="0" indent="0" algn="l" defTabSz="1155700">
+          <a:pPr marL="0" lvl="0" indent="0" algn="l" defTabSz="1111250">
             <a:lnSpc>
               <a:spcPct val="90000"/>
             </a:lnSpc>
@@ -2157,26 +2222,54 @@
             <a:buNone/>
           </a:pPr>
           <a:r>
-            <a:rPr lang="pl-PL" sz="2600" kern="1200"/>
-            <a:t>DTO-based contract distribution and testing</a:t>
+            <a:rPr lang="pl-PL" sz="2500" kern="1200" dirty="0"/>
+            <a:t>DTO-</a:t>
           </a:r>
-          <a:endParaRPr lang="en-US" sz="2600" kern="1200"/>
+          <a:r>
+            <a:rPr lang="pl-PL" sz="2500" kern="1200" dirty="0" err="1"/>
+            <a:t>based</a:t>
+          </a:r>
+          <a:r>
+            <a:rPr lang="pl-PL" sz="2500" kern="1200" dirty="0"/>
+            <a:t> </a:t>
+          </a:r>
+          <a:r>
+            <a:rPr lang="pl-PL" sz="2500" kern="1200" dirty="0" err="1"/>
+            <a:t>contract</a:t>
+          </a:r>
+          <a:r>
+            <a:rPr lang="pl-PL" sz="2500" kern="1200" dirty="0"/>
+            <a:t> </a:t>
+          </a:r>
+          <a:r>
+            <a:rPr lang="pl-PL" sz="2500" kern="1200" dirty="0" err="1"/>
+            <a:t>distribution</a:t>
+          </a:r>
+          <a:r>
+            <a:rPr lang="pl-PL" sz="2500" kern="1200" dirty="0"/>
+            <a:t> and </a:t>
+          </a:r>
+          <a:r>
+            <a:rPr lang="pl-PL" sz="2500" kern="1200" dirty="0" err="1"/>
+            <a:t>testing</a:t>
+          </a:r>
+          <a:endParaRPr lang="en-US" sz="2500" kern="1200" dirty="0"/>
         </a:p>
       </dsp:txBody>
       <dsp:txXfrm>
-        <a:off x="0" y="2076331"/>
-        <a:ext cx="6912245" cy="692110"/>
+        <a:off x="0" y="1631751"/>
+        <a:ext cx="10233025" cy="543917"/>
       </dsp:txXfrm>
     </dsp:sp>
-    <dsp:sp modelId="{2A91D265-EB60-4839-97E1-9AA488EA30C9}">
+    <dsp:sp modelId="{9F587D63-3FA5-4DBA-9358-6E8280B0A899}">
       <dsp:nvSpPr>
         <dsp:cNvPr id="0" name=""/>
         <dsp:cNvSpPr/>
       </dsp:nvSpPr>
       <dsp:spPr>
         <a:xfrm>
-          <a:off x="0" y="2768441"/>
-          <a:ext cx="6912245" cy="0"/>
+          <a:off x="0" y="2175669"/>
+          <a:ext cx="10233025" cy="0"/>
         </a:xfrm>
         <a:prstGeom prst="line">
           <a:avLst/>
@@ -2184,10 +2277,10 @@
         <a:gradFill rotWithShape="0">
           <a:gsLst>
             <a:gs pos="0">
-              <a:schemeClr val="accent2">
-                <a:hueOff val="-2921713"/>
-                <a:satOff val="-3897"/>
-                <a:lumOff val="-11653"/>
+              <a:schemeClr val="accent6">
+                <a:hueOff val="0"/>
+                <a:satOff val="0"/>
+                <a:lumOff val="0"/>
                 <a:alphaOff val="0"/>
                 <a:satMod val="103000"/>
                 <a:lumMod val="102000"/>
@@ -2195,10 +2288,10 @@
               </a:schemeClr>
             </a:gs>
             <a:gs pos="50000">
-              <a:schemeClr val="accent2">
-                <a:hueOff val="-2921713"/>
-                <a:satOff val="-3897"/>
-                <a:lumOff val="-11653"/>
+              <a:schemeClr val="accent6">
+                <a:hueOff val="0"/>
+                <a:satOff val="0"/>
+                <a:lumOff val="0"/>
                 <a:alphaOff val="0"/>
                 <a:satMod val="110000"/>
                 <a:lumMod val="100000"/>
@@ -2206,10 +2299,10 @@
               </a:schemeClr>
             </a:gs>
             <a:gs pos="100000">
-              <a:schemeClr val="accent2">
-                <a:hueOff val="-2921713"/>
-                <a:satOff val="-3897"/>
-                <a:lumOff val="-11653"/>
+              <a:schemeClr val="accent6">
+                <a:hueOff val="0"/>
+                <a:satOff val="0"/>
+                <a:lumOff val="0"/>
                 <a:alphaOff val="0"/>
                 <a:lumMod val="99000"/>
                 <a:satMod val="120000"/>
@@ -2221,17 +2314,23 @@
         </a:gradFill>
         <a:ln w="6350" cap="flat" cmpd="sng" algn="ctr">
           <a:solidFill>
-            <a:schemeClr val="accent2">
-              <a:hueOff val="-2921713"/>
-              <a:satOff val="-3897"/>
-              <a:lumOff val="-11653"/>
+            <a:schemeClr val="accent6">
+              <a:hueOff val="0"/>
+              <a:satOff val="0"/>
+              <a:lumOff val="0"/>
               <a:alphaOff val="0"/>
             </a:schemeClr>
           </a:solidFill>
           <a:prstDash val="solid"/>
           <a:miter lim="800000"/>
         </a:ln>
-        <a:effectLst/>
+        <a:effectLst>
+          <a:outerShdw blurRad="57150" dist="19050" dir="5400000" algn="ctr" rotWithShape="0">
+            <a:srgbClr val="000000">
+              <a:alpha val="63000"/>
+            </a:srgbClr>
+          </a:outerShdw>
+        </a:effectLst>
       </dsp:spPr>
       <dsp:style>
         <a:lnRef idx="1">
@@ -2240,7 +2339,7 @@
         <a:fillRef idx="3">
           <a:scrgbClr r="0" g="0" b="0"/>
         </a:fillRef>
-        <a:effectRef idx="2">
+        <a:effectRef idx="3">
           <a:scrgbClr r="0" g="0" b="0"/>
         </a:effectRef>
         <a:fontRef idx="minor">
@@ -2248,15 +2347,15 @@
         </a:fontRef>
       </dsp:style>
     </dsp:sp>
-    <dsp:sp modelId="{58D49E44-B802-4068-A5A6-B8D92FCBD73D}">
+    <dsp:sp modelId="{7D4D26FA-0AA0-40FB-8AD5-BE3961E89C2F}">
       <dsp:nvSpPr>
         <dsp:cNvPr id="0" name=""/>
         <dsp:cNvSpPr/>
       </dsp:nvSpPr>
       <dsp:spPr>
         <a:xfrm>
-          <a:off x="0" y="2768441"/>
-          <a:ext cx="6912245" cy="692110"/>
+          <a:off x="0" y="2175669"/>
+          <a:ext cx="10233025" cy="543917"/>
         </a:xfrm>
         <a:prstGeom prst="rect">
           <a:avLst/>
@@ -2280,12 +2379,12 @@
         <a:fontRef idx="minor"/>
       </dsp:style>
       <dsp:txBody>
-        <a:bodyPr spcFirstLastPara="0" vert="horz" wrap="square" lIns="99060" tIns="99060" rIns="99060" bIns="99060" numCol="1" spcCol="1270" anchor="t" anchorCtr="0">
+        <a:bodyPr spcFirstLastPara="0" vert="horz" wrap="square" lIns="95250" tIns="95250" rIns="95250" bIns="95250" numCol="1" spcCol="1270" anchor="t" anchorCtr="0">
           <a:noAutofit/>
         </a:bodyPr>
         <a:lstStyle/>
         <a:p>
-          <a:pPr marL="0" lvl="0" indent="0" algn="l" defTabSz="1155700">
+          <a:pPr marL="0" lvl="0" indent="0" algn="l" defTabSz="1111250">
             <a:lnSpc>
               <a:spcPct val="90000"/>
             </a:lnSpc>
@@ -2298,26 +2397,50 @@
             <a:buNone/>
           </a:pPr>
           <a:r>
-            <a:rPr lang="pl-PL" sz="2600" kern="1200"/>
-            <a:t>OpenAPI contract distribution and testing</a:t>
+            <a:rPr lang="pl-PL" sz="2500" kern="1200" dirty="0" err="1"/>
+            <a:t>OpenAPI</a:t>
           </a:r>
-          <a:endParaRPr lang="en-US" sz="2600" kern="1200"/>
+          <a:r>
+            <a:rPr lang="pl-PL" sz="2500" kern="1200" dirty="0"/>
+            <a:t> </a:t>
+          </a:r>
+          <a:r>
+            <a:rPr lang="pl-PL" sz="2500" kern="1200" dirty="0" err="1"/>
+            <a:t>contract</a:t>
+          </a:r>
+          <a:r>
+            <a:rPr lang="pl-PL" sz="2500" kern="1200" dirty="0"/>
+            <a:t> </a:t>
+          </a:r>
+          <a:r>
+            <a:rPr lang="pl-PL" sz="2500" kern="1200" dirty="0" err="1"/>
+            <a:t>distribution</a:t>
+          </a:r>
+          <a:r>
+            <a:rPr lang="pl-PL" sz="2500" kern="1200" dirty="0"/>
+            <a:t> and </a:t>
+          </a:r>
+          <a:r>
+            <a:rPr lang="pl-PL" sz="2500" kern="1200" dirty="0" err="1"/>
+            <a:t>testing</a:t>
+          </a:r>
+          <a:endParaRPr lang="en-US" sz="2500" kern="1200" dirty="0"/>
         </a:p>
       </dsp:txBody>
       <dsp:txXfrm>
-        <a:off x="0" y="2768441"/>
-        <a:ext cx="6912245" cy="692110"/>
+        <a:off x="0" y="2175669"/>
+        <a:ext cx="10233025" cy="543917"/>
       </dsp:txXfrm>
     </dsp:sp>
-    <dsp:sp modelId="{26C37521-C4B8-45A3-9CF4-60AA2F47B390}">
+    <dsp:sp modelId="{9DABA41B-051B-44E8-B5B7-6BB556C2463F}">
       <dsp:nvSpPr>
         <dsp:cNvPr id="0" name=""/>
         <dsp:cNvSpPr/>
       </dsp:nvSpPr>
       <dsp:spPr>
         <a:xfrm>
-          <a:off x="0" y="3460551"/>
-          <a:ext cx="6912245" cy="0"/>
+          <a:off x="0" y="2719586"/>
+          <a:ext cx="10233025" cy="0"/>
         </a:xfrm>
         <a:prstGeom prst="line">
           <a:avLst/>
@@ -2325,10 +2448,10 @@
         <a:gradFill rotWithShape="0">
           <a:gsLst>
             <a:gs pos="0">
-              <a:schemeClr val="accent2">
-                <a:hueOff val="-3652141"/>
-                <a:satOff val="-4871"/>
-                <a:lumOff val="-14566"/>
+              <a:schemeClr val="accent6">
+                <a:hueOff val="0"/>
+                <a:satOff val="0"/>
+                <a:lumOff val="0"/>
                 <a:alphaOff val="0"/>
                 <a:satMod val="103000"/>
                 <a:lumMod val="102000"/>
@@ -2336,10 +2459,10 @@
               </a:schemeClr>
             </a:gs>
             <a:gs pos="50000">
-              <a:schemeClr val="accent2">
-                <a:hueOff val="-3652141"/>
-                <a:satOff val="-4871"/>
-                <a:lumOff val="-14566"/>
+              <a:schemeClr val="accent6">
+                <a:hueOff val="0"/>
+                <a:satOff val="0"/>
+                <a:lumOff val="0"/>
                 <a:alphaOff val="0"/>
                 <a:satMod val="110000"/>
                 <a:lumMod val="100000"/>
@@ -2347,10 +2470,10 @@
               </a:schemeClr>
             </a:gs>
             <a:gs pos="100000">
-              <a:schemeClr val="accent2">
-                <a:hueOff val="-3652141"/>
-                <a:satOff val="-4871"/>
-                <a:lumOff val="-14566"/>
+              <a:schemeClr val="accent6">
+                <a:hueOff val="0"/>
+                <a:satOff val="0"/>
+                <a:lumOff val="0"/>
                 <a:alphaOff val="0"/>
                 <a:lumMod val="99000"/>
                 <a:satMod val="120000"/>
@@ -2362,17 +2485,23 @@
         </a:gradFill>
         <a:ln w="6350" cap="flat" cmpd="sng" algn="ctr">
           <a:solidFill>
-            <a:schemeClr val="accent2">
-              <a:hueOff val="-3652141"/>
-              <a:satOff val="-4871"/>
-              <a:lumOff val="-14566"/>
+            <a:schemeClr val="accent6">
+              <a:hueOff val="0"/>
+              <a:satOff val="0"/>
+              <a:lumOff val="0"/>
               <a:alphaOff val="0"/>
             </a:schemeClr>
           </a:solidFill>
           <a:prstDash val="solid"/>
           <a:miter lim="800000"/>
         </a:ln>
-        <a:effectLst/>
+        <a:effectLst>
+          <a:outerShdw blurRad="57150" dist="19050" dir="5400000" algn="ctr" rotWithShape="0">
+            <a:srgbClr val="000000">
+              <a:alpha val="63000"/>
+            </a:srgbClr>
+          </a:outerShdw>
+        </a:effectLst>
       </dsp:spPr>
       <dsp:style>
         <a:lnRef idx="1">
@@ -2381,7 +2510,7 @@
         <a:fillRef idx="3">
           <a:scrgbClr r="0" g="0" b="0"/>
         </a:fillRef>
-        <a:effectRef idx="2">
+        <a:effectRef idx="3">
           <a:scrgbClr r="0" g="0" b="0"/>
         </a:effectRef>
         <a:fontRef idx="minor">
@@ -2389,15 +2518,15 @@
         </a:fontRef>
       </dsp:style>
     </dsp:sp>
-    <dsp:sp modelId="{702A8ECA-5490-43A4-B5D7-71B908B075F6}">
+    <dsp:sp modelId="{3EDE19F7-785B-46C9-867B-20365497F041}">
       <dsp:nvSpPr>
         <dsp:cNvPr id="0" name=""/>
         <dsp:cNvSpPr/>
       </dsp:nvSpPr>
       <dsp:spPr>
         <a:xfrm>
-          <a:off x="0" y="3460551"/>
-          <a:ext cx="6912245" cy="692110"/>
+          <a:off x="0" y="2719586"/>
+          <a:ext cx="10233025" cy="543917"/>
         </a:xfrm>
         <a:prstGeom prst="rect">
           <a:avLst/>
@@ -2421,12 +2550,12 @@
         <a:fontRef idx="minor"/>
       </dsp:style>
       <dsp:txBody>
-        <a:bodyPr spcFirstLastPara="0" vert="horz" wrap="square" lIns="99060" tIns="99060" rIns="99060" bIns="99060" numCol="1" spcCol="1270" anchor="t" anchorCtr="0">
+        <a:bodyPr spcFirstLastPara="0" vert="horz" wrap="square" lIns="95250" tIns="95250" rIns="95250" bIns="95250" numCol="1" spcCol="1270" anchor="t" anchorCtr="0">
           <a:noAutofit/>
         </a:bodyPr>
         <a:lstStyle/>
         <a:p>
-          <a:pPr marL="0" lvl="0" indent="0" algn="l" defTabSz="1155700">
+          <a:pPr marL="0" lvl="0" indent="0" algn="l" defTabSz="1111250">
             <a:lnSpc>
               <a:spcPct val="90000"/>
             </a:lnSpc>
@@ -2439,26 +2568,38 @@
             <a:buNone/>
           </a:pPr>
           <a:r>
-            <a:rPr lang="pl-PL" sz="2600" kern="1200"/>
-            <a:t>Special service dependency considerations</a:t>
+            <a:rPr lang="pl-PL" sz="2500" kern="1200" dirty="0"/>
+            <a:t>Special service </a:t>
           </a:r>
-          <a:endParaRPr lang="en-US" sz="2600" kern="1200"/>
+          <a:r>
+            <a:rPr lang="pl-PL" sz="2500" kern="1200" dirty="0" err="1"/>
+            <a:t>dependency</a:t>
+          </a:r>
+          <a:r>
+            <a:rPr lang="pl-PL" sz="2500" kern="1200" dirty="0"/>
+            <a:t> </a:t>
+          </a:r>
+          <a:r>
+            <a:rPr lang="pl-PL" sz="2500" kern="1200" dirty="0" err="1"/>
+            <a:t>considerations</a:t>
+          </a:r>
+          <a:endParaRPr lang="en-US" sz="2500" kern="1200" dirty="0"/>
         </a:p>
       </dsp:txBody>
       <dsp:txXfrm>
-        <a:off x="0" y="3460551"/>
-        <a:ext cx="6912245" cy="692110"/>
+        <a:off x="0" y="2719586"/>
+        <a:ext cx="10233025" cy="543917"/>
       </dsp:txXfrm>
     </dsp:sp>
-    <dsp:sp modelId="{CD1E4688-FEDC-4C75-B49B-50FAB344E5B5}">
+    <dsp:sp modelId="{B75637E6-9869-47DC-8A6F-4C125967AF15}">
       <dsp:nvSpPr>
         <dsp:cNvPr id="0" name=""/>
         <dsp:cNvSpPr/>
       </dsp:nvSpPr>
       <dsp:spPr>
         <a:xfrm>
-          <a:off x="0" y="4152662"/>
-          <a:ext cx="6912245" cy="0"/>
+          <a:off x="0" y="3263503"/>
+          <a:ext cx="10233025" cy="0"/>
         </a:xfrm>
         <a:prstGeom prst="line">
           <a:avLst/>
@@ -2466,10 +2607,10 @@
         <a:gradFill rotWithShape="0">
           <a:gsLst>
             <a:gs pos="0">
-              <a:schemeClr val="accent2">
-                <a:hueOff val="-4382569"/>
-                <a:satOff val="-5846"/>
-                <a:lumOff val="-17479"/>
+              <a:schemeClr val="accent6">
+                <a:hueOff val="0"/>
+                <a:satOff val="0"/>
+                <a:lumOff val="0"/>
                 <a:alphaOff val="0"/>
                 <a:satMod val="103000"/>
                 <a:lumMod val="102000"/>
@@ -2477,10 +2618,10 @@
               </a:schemeClr>
             </a:gs>
             <a:gs pos="50000">
-              <a:schemeClr val="accent2">
-                <a:hueOff val="-4382569"/>
-                <a:satOff val="-5846"/>
-                <a:lumOff val="-17479"/>
+              <a:schemeClr val="accent6">
+                <a:hueOff val="0"/>
+                <a:satOff val="0"/>
+                <a:lumOff val="0"/>
                 <a:alphaOff val="0"/>
                 <a:satMod val="110000"/>
                 <a:lumMod val="100000"/>
@@ -2488,10 +2629,10 @@
               </a:schemeClr>
             </a:gs>
             <a:gs pos="100000">
-              <a:schemeClr val="accent2">
-                <a:hueOff val="-4382569"/>
-                <a:satOff val="-5846"/>
-                <a:lumOff val="-17479"/>
+              <a:schemeClr val="accent6">
+                <a:hueOff val="0"/>
+                <a:satOff val="0"/>
+                <a:lumOff val="0"/>
                 <a:alphaOff val="0"/>
                 <a:lumMod val="99000"/>
                 <a:satMod val="120000"/>
@@ -2503,17 +2644,23 @@
         </a:gradFill>
         <a:ln w="6350" cap="flat" cmpd="sng" algn="ctr">
           <a:solidFill>
-            <a:schemeClr val="accent2">
-              <a:hueOff val="-4382569"/>
-              <a:satOff val="-5846"/>
-              <a:lumOff val="-17479"/>
+            <a:schemeClr val="accent6">
+              <a:hueOff val="0"/>
+              <a:satOff val="0"/>
+              <a:lumOff val="0"/>
               <a:alphaOff val="0"/>
             </a:schemeClr>
           </a:solidFill>
           <a:prstDash val="solid"/>
           <a:miter lim="800000"/>
         </a:ln>
-        <a:effectLst/>
+        <a:effectLst>
+          <a:outerShdw blurRad="57150" dist="19050" dir="5400000" algn="ctr" rotWithShape="0">
+            <a:srgbClr val="000000">
+              <a:alpha val="63000"/>
+            </a:srgbClr>
+          </a:outerShdw>
+        </a:effectLst>
       </dsp:spPr>
       <dsp:style>
         <a:lnRef idx="1">
@@ -2522,7 +2669,7 @@
         <a:fillRef idx="3">
           <a:scrgbClr r="0" g="0" b="0"/>
         </a:fillRef>
-        <a:effectRef idx="2">
+        <a:effectRef idx="3">
           <a:scrgbClr r="0" g="0" b="0"/>
         </a:effectRef>
         <a:fontRef idx="minor">
@@ -2530,15 +2677,15 @@
         </a:fontRef>
       </dsp:style>
     </dsp:sp>
-    <dsp:sp modelId="{8F900130-C9A3-4D7C-AA17-34733A33081B}">
+    <dsp:sp modelId="{9BCB3BE5-8B53-4F87-9641-BEA6D100A0C0}">
       <dsp:nvSpPr>
         <dsp:cNvPr id="0" name=""/>
         <dsp:cNvSpPr/>
       </dsp:nvSpPr>
       <dsp:spPr>
         <a:xfrm>
-          <a:off x="0" y="4152662"/>
-          <a:ext cx="6912245" cy="692110"/>
+          <a:off x="0" y="3263503"/>
+          <a:ext cx="10233025" cy="543917"/>
         </a:xfrm>
         <a:prstGeom prst="rect">
           <a:avLst/>
@@ -2562,12 +2709,12 @@
         <a:fontRef idx="minor"/>
       </dsp:style>
       <dsp:txBody>
-        <a:bodyPr spcFirstLastPara="0" vert="horz" wrap="square" lIns="99060" tIns="99060" rIns="99060" bIns="99060" numCol="1" spcCol="1270" anchor="t" anchorCtr="0">
+        <a:bodyPr spcFirstLastPara="0" vert="horz" wrap="square" lIns="95250" tIns="95250" rIns="95250" bIns="95250" numCol="1" spcCol="1270" anchor="t" anchorCtr="0">
           <a:noAutofit/>
         </a:bodyPr>
         <a:lstStyle/>
         <a:p>
-          <a:pPr marL="0" lvl="0" indent="0" algn="l" defTabSz="1155700">
+          <a:pPr marL="0" lvl="0" indent="0" algn="l" defTabSz="1111250">
             <a:lnSpc>
               <a:spcPct val="90000"/>
             </a:lnSpc>
@@ -2580,26 +2727,38 @@
             <a:buNone/>
           </a:pPr>
           <a:r>
-            <a:rPr lang="pl-PL" sz="2600" kern="1200"/>
-            <a:t>Non-REST contract distribution</a:t>
+            <a:rPr lang="pl-PL" sz="2500" kern="1200" dirty="0"/>
+            <a:t>Non-REST </a:t>
           </a:r>
-          <a:endParaRPr lang="en-US" sz="2600" kern="1200"/>
+          <a:r>
+            <a:rPr lang="pl-PL" sz="2500" kern="1200" dirty="0" err="1"/>
+            <a:t>contract</a:t>
+          </a:r>
+          <a:r>
+            <a:rPr lang="pl-PL" sz="2500" kern="1200" dirty="0"/>
+            <a:t> </a:t>
+          </a:r>
+          <a:r>
+            <a:rPr lang="pl-PL" sz="2500" kern="1200" dirty="0" err="1"/>
+            <a:t>distribution</a:t>
+          </a:r>
+          <a:endParaRPr lang="en-US" sz="2500" kern="1200" dirty="0"/>
         </a:p>
       </dsp:txBody>
       <dsp:txXfrm>
-        <a:off x="0" y="4152662"/>
-        <a:ext cx="6912245" cy="692110"/>
+        <a:off x="0" y="3263503"/>
+        <a:ext cx="10233025" cy="543917"/>
       </dsp:txXfrm>
     </dsp:sp>
-    <dsp:sp modelId="{DFC0BD0F-665D-466C-A8B1-57D9A424B7B3}">
+    <dsp:sp modelId="{92C3B48E-1071-4772-B1F6-8414AE145A1C}">
       <dsp:nvSpPr>
         <dsp:cNvPr id="0" name=""/>
         <dsp:cNvSpPr/>
       </dsp:nvSpPr>
       <dsp:spPr>
         <a:xfrm>
-          <a:off x="0" y="4844772"/>
-          <a:ext cx="6912245" cy="0"/>
+          <a:off x="0" y="3807420"/>
+          <a:ext cx="10233025" cy="0"/>
         </a:xfrm>
         <a:prstGeom prst="line">
           <a:avLst/>
@@ -2607,10 +2766,10 @@
         <a:gradFill rotWithShape="0">
           <a:gsLst>
             <a:gs pos="0">
-              <a:schemeClr val="accent2">
-                <a:hueOff val="-5112997"/>
-                <a:satOff val="-6820"/>
-                <a:lumOff val="-20392"/>
+              <a:schemeClr val="accent6">
+                <a:hueOff val="0"/>
+                <a:satOff val="0"/>
+                <a:lumOff val="0"/>
                 <a:alphaOff val="0"/>
                 <a:satMod val="103000"/>
                 <a:lumMod val="102000"/>
@@ -2618,10 +2777,10 @@
               </a:schemeClr>
             </a:gs>
             <a:gs pos="50000">
-              <a:schemeClr val="accent2">
-                <a:hueOff val="-5112997"/>
-                <a:satOff val="-6820"/>
-                <a:lumOff val="-20392"/>
+              <a:schemeClr val="accent6">
+                <a:hueOff val="0"/>
+                <a:satOff val="0"/>
+                <a:lumOff val="0"/>
                 <a:alphaOff val="0"/>
                 <a:satMod val="110000"/>
                 <a:lumMod val="100000"/>
@@ -2629,10 +2788,10 @@
               </a:schemeClr>
             </a:gs>
             <a:gs pos="100000">
-              <a:schemeClr val="accent2">
-                <a:hueOff val="-5112997"/>
-                <a:satOff val="-6820"/>
-                <a:lumOff val="-20392"/>
+              <a:schemeClr val="accent6">
+                <a:hueOff val="0"/>
+                <a:satOff val="0"/>
+                <a:lumOff val="0"/>
                 <a:alphaOff val="0"/>
                 <a:lumMod val="99000"/>
                 <a:satMod val="120000"/>
@@ -2644,17 +2803,23 @@
         </a:gradFill>
         <a:ln w="6350" cap="flat" cmpd="sng" algn="ctr">
           <a:solidFill>
-            <a:schemeClr val="accent2">
-              <a:hueOff val="-5112997"/>
-              <a:satOff val="-6820"/>
-              <a:lumOff val="-20392"/>
+            <a:schemeClr val="accent6">
+              <a:hueOff val="0"/>
+              <a:satOff val="0"/>
+              <a:lumOff val="0"/>
               <a:alphaOff val="0"/>
             </a:schemeClr>
           </a:solidFill>
           <a:prstDash val="solid"/>
           <a:miter lim="800000"/>
         </a:ln>
-        <a:effectLst/>
+        <a:effectLst>
+          <a:outerShdw blurRad="57150" dist="19050" dir="5400000" algn="ctr" rotWithShape="0">
+            <a:srgbClr val="000000">
+              <a:alpha val="63000"/>
+            </a:srgbClr>
+          </a:outerShdw>
+        </a:effectLst>
       </dsp:spPr>
       <dsp:style>
         <a:lnRef idx="1">
@@ -2663,7 +2828,7 @@
         <a:fillRef idx="3">
           <a:scrgbClr r="0" g="0" b="0"/>
         </a:fillRef>
-        <a:effectRef idx="2">
+        <a:effectRef idx="3">
           <a:scrgbClr r="0" g="0" b="0"/>
         </a:effectRef>
         <a:fontRef idx="minor">
@@ -2671,15 +2836,15 @@
         </a:fontRef>
       </dsp:style>
     </dsp:sp>
-    <dsp:sp modelId="{1C20CB16-9D30-4D8A-AFB9-87A5A7E59224}">
+    <dsp:sp modelId="{03AB9369-BB9C-4D58-96F0-F7EF9250FF4B}">
       <dsp:nvSpPr>
         <dsp:cNvPr id="0" name=""/>
         <dsp:cNvSpPr/>
       </dsp:nvSpPr>
       <dsp:spPr>
         <a:xfrm>
-          <a:off x="0" y="4844772"/>
-          <a:ext cx="6912245" cy="692110"/>
+          <a:off x="0" y="3807420"/>
+          <a:ext cx="10233025" cy="543917"/>
         </a:xfrm>
         <a:prstGeom prst="rect">
           <a:avLst/>
@@ -2703,12 +2868,12 @@
         <a:fontRef idx="minor"/>
       </dsp:style>
       <dsp:txBody>
-        <a:bodyPr spcFirstLastPara="0" vert="horz" wrap="square" lIns="99060" tIns="99060" rIns="99060" bIns="99060" numCol="1" spcCol="1270" anchor="t" anchorCtr="0">
+        <a:bodyPr spcFirstLastPara="0" vert="horz" wrap="square" lIns="95250" tIns="95250" rIns="95250" bIns="95250" numCol="1" spcCol="1270" anchor="t" anchorCtr="0">
           <a:noAutofit/>
         </a:bodyPr>
         <a:lstStyle/>
         <a:p>
-          <a:pPr marL="0" lvl="0" indent="0" algn="l" defTabSz="1155700">
+          <a:pPr marL="0" lvl="0" indent="0" algn="l" defTabSz="1111250">
             <a:lnSpc>
               <a:spcPct val="90000"/>
             </a:lnSpc>
@@ -2721,15 +2886,15 @@
             <a:buNone/>
           </a:pPr>
           <a:r>
-            <a:rPr lang="pl-PL" sz="2600" kern="1200"/>
+            <a:rPr lang="pl-PL" sz="2500" kern="1200" dirty="0" err="1"/>
             <a:t>Questions</a:t>
           </a:r>
-          <a:endParaRPr lang="en-US" sz="2600" kern="1200"/>
+          <a:endParaRPr lang="en-US" sz="2500" kern="1200" dirty="0"/>
         </a:p>
       </dsp:txBody>
       <dsp:txXfrm>
-        <a:off x="0" y="4844772"/>
-        <a:ext cx="6912245" cy="692110"/>
+        <a:off x="0" y="3807420"/>
+        <a:ext cx="10233025" cy="543917"/>
       </dsp:txXfrm>
     </dsp:sp>
   </dsp:spTree>
@@ -3203,11 +3368,11 @@
 </file>
 
 <file path=ppt/diagrams/quickStyle1.xml><?xml version="1.0" encoding="utf-8"?>
-<dgm:styleDef xmlns:dgm="http://schemas.openxmlformats.org/drawingml/2006/diagram" xmlns:a="http://schemas.openxmlformats.org/drawingml/2006/main" uniqueId="urn:microsoft.com/office/officeart/2005/8/quickstyle/simple4">
+<dgm:styleDef xmlns:dgm="http://schemas.openxmlformats.org/drawingml/2006/diagram" xmlns:a="http://schemas.openxmlformats.org/drawingml/2006/main" uniqueId="urn:microsoft.com/office/officeart/2005/8/quickstyle/simple5">
   <dgm:title val=""/>
   <dgm:desc val=""/>
   <dgm:catLst>
-    <dgm:cat type="simple" pri="10400"/>
+    <dgm:cat type="simple" pri="10500"/>
   </dgm:catLst>
   <dgm:scene3d>
     <a:camera prst="orthographicFront"/>
@@ -3227,7 +3392,7 @@
       <a:fillRef idx="3">
         <a:scrgbClr r="0" g="0" b="0"/>
       </a:fillRef>
-      <a:effectRef idx="2">
+      <a:effectRef idx="3">
         <a:scrgbClr r="0" g="0" b="0"/>
       </a:effectRef>
       <a:fontRef idx="minor">
@@ -3243,13 +3408,13 @@
     <dgm:sp3d/>
     <dgm:txPr/>
     <dgm:style>
-      <a:lnRef idx="1">
+      <a:lnRef idx="0">
         <a:scrgbClr r="0" g="0" b="0"/>
       </a:lnRef>
       <a:fillRef idx="3">
         <a:scrgbClr r="0" g="0" b="0"/>
       </a:fillRef>
-      <a:effectRef idx="2">
+      <a:effectRef idx="3">
         <a:scrgbClr r="0" g="0" b="0"/>
       </a:effectRef>
       <a:fontRef idx="minor">
@@ -3271,7 +3436,7 @@
       <a:fillRef idx="3">
         <a:scrgbClr r="0" g="0" b="0"/>
       </a:fillRef>
-      <a:effectRef idx="0">
+      <a:effectRef idx="3">
         <a:scrgbClr r="0" g="0" b="0"/>
       </a:effectRef>
       <a:fontRef idx="minor">
@@ -3293,7 +3458,7 @@
       <a:fillRef idx="3">
         <a:scrgbClr r="0" g="0" b="0"/>
       </a:fillRef>
-      <a:effectRef idx="2">
+      <a:effectRef idx="3">
         <a:scrgbClr r="0" g="0" b="0"/>
       </a:effectRef>
       <a:fontRef idx="minor">
@@ -3315,7 +3480,7 @@
       <a:fillRef idx="3">
         <a:scrgbClr r="0" g="0" b="0"/>
       </a:fillRef>
-      <a:effectRef idx="2">
+      <a:effectRef idx="3">
         <a:scrgbClr r="0" g="0" b="0"/>
       </a:effectRef>
       <a:fontRef idx="minor">
@@ -3337,7 +3502,7 @@
       <a:fillRef idx="3">
         <a:scrgbClr r="0" g="0" b="0"/>
       </a:fillRef>
-      <a:effectRef idx="2">
+      <a:effectRef idx="3">
         <a:scrgbClr r="0" g="0" b="0"/>
       </a:effectRef>
       <a:fontRef idx="minor">
@@ -3359,7 +3524,7 @@
       <a:fillRef idx="3">
         <a:scrgbClr r="0" g="0" b="0"/>
       </a:fillRef>
-      <a:effectRef idx="2">
+      <a:effectRef idx="3">
         <a:scrgbClr r="0" g="0" b="0"/>
       </a:effectRef>
       <a:fontRef idx="minor">
@@ -3381,7 +3546,7 @@
       <a:fillRef idx="3">
         <a:scrgbClr r="0" g="0" b="0"/>
       </a:fillRef>
-      <a:effectRef idx="2">
+      <a:effectRef idx="3">
         <a:scrgbClr r="0" g="0" b="0"/>
       </a:effectRef>
       <a:fontRef idx="minor">
@@ -3403,7 +3568,7 @@
       <a:fillRef idx="1">
         <a:scrgbClr r="0" g="0" b="0"/>
       </a:fillRef>
-      <a:effectRef idx="2">
+      <a:effectRef idx="3">
         <a:scrgbClr r="0" g="0" b="0"/>
       </a:effectRef>
       <a:fontRef idx="minor"/>
@@ -3423,7 +3588,7 @@
       <a:fillRef idx="1">
         <a:scrgbClr r="0" g="0" b="0"/>
       </a:fillRef>
-      <a:effectRef idx="2">
+      <a:effectRef idx="3">
         <a:scrgbClr r="0" g="0" b="0"/>
       </a:effectRef>
       <a:fontRef idx="minor"/>
@@ -3443,7 +3608,7 @@
       <a:fillRef idx="1">
         <a:scrgbClr r="0" g="0" b="0"/>
       </a:fillRef>
-      <a:effectRef idx="2">
+      <a:effectRef idx="3">
         <a:scrgbClr r="0" g="0" b="0"/>
       </a:effectRef>
       <a:fontRef idx="minor"/>
@@ -3463,7 +3628,7 @@
       <a:fillRef idx="3">
         <a:scrgbClr r="0" g="0" b="0"/>
       </a:fillRef>
-      <a:effectRef idx="2">
+      <a:effectRef idx="3">
         <a:scrgbClr r="0" g="0" b="0"/>
       </a:effectRef>
       <a:fontRef idx="minor">
@@ -3485,7 +3650,7 @@
       <a:fillRef idx="3">
         <a:scrgbClr r="0" g="0" b="0"/>
       </a:fillRef>
-      <a:effectRef idx="2">
+      <a:effectRef idx="3">
         <a:scrgbClr r="0" g="0" b="0"/>
       </a:effectRef>
       <a:fontRef idx="minor">
@@ -3507,7 +3672,7 @@
       <a:fillRef idx="3">
         <a:scrgbClr r="0" g="0" b="0"/>
       </a:fillRef>
-      <a:effectRef idx="2">
+      <a:effectRef idx="3">
         <a:scrgbClr r="0" g="0" b="0"/>
       </a:effectRef>
       <a:fontRef idx="minor">
@@ -3543,10 +3708,10 @@
     <dgm:sp3d/>
     <dgm:txPr/>
     <dgm:style>
-      <a:lnRef idx="2">
+      <a:lnRef idx="1">
         <a:scrgbClr r="0" g="0" b="0"/>
       </a:lnRef>
-      <a:fillRef idx="1">
+      <a:fillRef idx="0">
         <a:scrgbClr r="0" g="0" b="0"/>
       </a:fillRef>
       <a:effectRef idx="1">
@@ -3569,7 +3734,7 @@
       <a:fillRef idx="3">
         <a:scrgbClr r="0" g="0" b="0"/>
       </a:fillRef>
-      <a:effectRef idx="2">
+      <a:effectRef idx="3">
         <a:scrgbClr r="0" g="0" b="0"/>
       </a:effectRef>
       <a:fontRef idx="minor">
@@ -3591,7 +3756,7 @@
       <a:fillRef idx="3">
         <a:scrgbClr r="0" g="0" b="0"/>
       </a:fillRef>
-      <a:effectRef idx="2">
+      <a:effectRef idx="3">
         <a:scrgbClr r="0" g="0" b="0"/>
       </a:effectRef>
       <a:fontRef idx="minor">
@@ -3613,7 +3778,7 @@
       <a:fillRef idx="3">
         <a:scrgbClr r="0" g="0" b="0"/>
       </a:fillRef>
-      <a:effectRef idx="2">
+      <a:effectRef idx="3">
         <a:scrgbClr r="0" g="0" b="0"/>
       </a:effectRef>
       <a:fontRef idx="minor">
@@ -3635,7 +3800,7 @@
       <a:fillRef idx="3">
         <a:scrgbClr r="0" g="0" b="0"/>
       </a:fillRef>
-      <a:effectRef idx="2">
+      <a:effectRef idx="3">
         <a:scrgbClr r="0" g="0" b="0"/>
       </a:effectRef>
       <a:fontRef idx="minor">
@@ -3657,7 +3822,7 @@
       <a:fillRef idx="3">
         <a:scrgbClr r="0" g="0" b="0"/>
       </a:fillRef>
-      <a:effectRef idx="2">
+      <a:effectRef idx="3">
         <a:scrgbClr r="0" g="0" b="0"/>
       </a:effectRef>
       <a:fontRef idx="minor">
@@ -3679,7 +3844,7 @@
       <a:fillRef idx="3">
         <a:scrgbClr r="0" g="0" b="0"/>
       </a:fillRef>
-      <a:effectRef idx="2">
+      <a:effectRef idx="3">
         <a:scrgbClr r="0" g="0" b="0"/>
       </a:effectRef>
       <a:fontRef idx="minor">
@@ -3701,7 +3866,7 @@
       <a:fillRef idx="3">
         <a:scrgbClr r="0" g="0" b="0"/>
       </a:fillRef>
-      <a:effectRef idx="2">
+      <a:effectRef idx="3">
         <a:scrgbClr r="0" g="0" b="0"/>
       </a:effectRef>
       <a:fontRef idx="minor">
@@ -3717,13 +3882,13 @@
     <dgm:sp3d/>
     <dgm:txPr/>
     <dgm:style>
-      <a:lnRef idx="1">
+      <a:lnRef idx="0">
         <a:scrgbClr r="0" g="0" b="0"/>
       </a:lnRef>
       <a:fillRef idx="3">
         <a:scrgbClr r="0" g="0" b="0"/>
       </a:fillRef>
-      <a:effectRef idx="2">
+      <a:effectRef idx="3">
         <a:scrgbClr r="0" g="0" b="0"/>
       </a:effectRef>
       <a:fontRef idx="minor">
@@ -3739,13 +3904,13 @@
     <dgm:sp3d/>
     <dgm:txPr/>
     <dgm:style>
-      <a:lnRef idx="1">
+      <a:lnRef idx="0">
         <a:scrgbClr r="0" g="0" b="0"/>
       </a:lnRef>
       <a:fillRef idx="3">
         <a:scrgbClr r="0" g="0" b="0"/>
       </a:fillRef>
-      <a:effectRef idx="2">
+      <a:effectRef idx="3">
         <a:scrgbClr r="0" g="0" b="0"/>
       </a:effectRef>
       <a:fontRef idx="minor">
@@ -3761,7 +3926,7 @@
     <dgm:sp3d/>
     <dgm:txPr/>
     <dgm:style>
-      <a:lnRef idx="1">
+      <a:lnRef idx="2">
         <a:scrgbClr r="0" g="0" b="0"/>
       </a:lnRef>
       <a:fillRef idx="0">
@@ -3781,7 +3946,7 @@
     <dgm:sp3d/>
     <dgm:txPr/>
     <dgm:style>
-      <a:lnRef idx="1">
+      <a:lnRef idx="2">
         <a:scrgbClr r="0" g="0" b="0"/>
       </a:lnRef>
       <a:fillRef idx="0">
@@ -3801,7 +3966,7 @@
     <dgm:sp3d/>
     <dgm:txPr/>
     <dgm:style>
-      <a:lnRef idx="1">
+      <a:lnRef idx="2">
         <a:scrgbClr r="0" g="0" b="0"/>
       </a:lnRef>
       <a:fillRef idx="0">
@@ -3821,7 +3986,7 @@
     <dgm:sp3d/>
     <dgm:txPr/>
     <dgm:style>
-      <a:lnRef idx="1">
+      <a:lnRef idx="2">
         <a:scrgbClr r="0" g="0" b="0"/>
       </a:lnRef>
       <a:fillRef idx="0">
@@ -3847,7 +4012,7 @@
       <a:fillRef idx="1">
         <a:scrgbClr r="0" g="0" b="0"/>
       </a:fillRef>
-      <a:effectRef idx="0">
+      <a:effectRef idx="2">
         <a:scrgbClr r="0" g="0" b="0"/>
       </a:effectRef>
       <a:fontRef idx="minor"/>
@@ -3867,7 +4032,7 @@
       <a:fillRef idx="1">
         <a:scrgbClr r="0" g="0" b="0"/>
       </a:fillRef>
-      <a:effectRef idx="0">
+      <a:effectRef idx="2">
         <a:scrgbClr r="0" g="0" b="0"/>
       </a:effectRef>
       <a:fontRef idx="minor"/>
@@ -3887,7 +4052,7 @@
       <a:fillRef idx="1">
         <a:scrgbClr r="0" g="0" b="0"/>
       </a:fillRef>
-      <a:effectRef idx="0">
+      <a:effectRef idx="2">
         <a:scrgbClr r="0" g="0" b="0"/>
       </a:effectRef>
       <a:fontRef idx="minor"/>
@@ -3927,7 +4092,7 @@
       <a:fillRef idx="1">
         <a:scrgbClr r="0" g="0" b="0"/>
       </a:fillRef>
-      <a:effectRef idx="0">
+      <a:effectRef idx="2">
         <a:scrgbClr r="0" g="0" b="0"/>
       </a:effectRef>
       <a:fontRef idx="minor"/>
@@ -3947,7 +4112,7 @@
       <a:fillRef idx="1">
         <a:scrgbClr r="0" g="0" b="0"/>
       </a:fillRef>
-      <a:effectRef idx="0">
+      <a:effectRef idx="2">
         <a:scrgbClr r="0" g="0" b="0"/>
       </a:effectRef>
       <a:fontRef idx="minor"/>
@@ -3967,7 +4132,7 @@
       <a:fillRef idx="1">
         <a:scrgbClr r="0" g="0" b="0"/>
       </a:fillRef>
-      <a:effectRef idx="0">
+      <a:effectRef idx="3">
         <a:scrgbClr r="0" g="0" b="0"/>
       </a:effectRef>
       <a:fontRef idx="minor"/>
@@ -3987,7 +4152,7 @@
       <a:fillRef idx="1">
         <a:scrgbClr r="0" g="0" b="0"/>
       </a:fillRef>
-      <a:effectRef idx="0">
+      <a:effectRef idx="3">
         <a:scrgbClr r="0" g="0" b="0"/>
       </a:effectRef>
       <a:fontRef idx="minor"/>
@@ -4007,7 +4172,7 @@
       <a:fillRef idx="1">
         <a:scrgbClr r="0" g="0" b="0"/>
       </a:fillRef>
-      <a:effectRef idx="0">
+      <a:effectRef idx="2">
         <a:scrgbClr r="0" g="0" b="0"/>
       </a:effectRef>
       <a:fontRef idx="minor"/>
@@ -4027,7 +4192,7 @@
       <a:fillRef idx="1">
         <a:scrgbClr r="0" g="0" b="0"/>
       </a:fillRef>
-      <a:effectRef idx="0">
+      <a:effectRef idx="2">
         <a:scrgbClr r="0" g="0" b="0"/>
       </a:effectRef>
       <a:fontRef idx="minor"/>
@@ -4047,7 +4212,7 @@
       <a:fillRef idx="1">
         <a:scrgbClr r="0" g="0" b="0"/>
       </a:fillRef>
-      <a:effectRef idx="0">
+      <a:effectRef idx="2">
         <a:scrgbClr r="0" g="0" b="0"/>
       </a:effectRef>
       <a:fontRef idx="minor"/>
@@ -4067,7 +4232,7 @@
       <a:fillRef idx="1">
         <a:scrgbClr r="0" g="0" b="0"/>
       </a:fillRef>
-      <a:effectRef idx="0">
+      <a:effectRef idx="2">
         <a:scrgbClr r="0" g="0" b="0"/>
       </a:effectRef>
       <a:fontRef idx="minor"/>
@@ -4087,7 +4252,7 @@
       <a:fillRef idx="1">
         <a:scrgbClr r="0" g="0" b="0"/>
       </a:fillRef>
-      <a:effectRef idx="0">
+      <a:effectRef idx="2">
         <a:scrgbClr r="0" g="0" b="0"/>
       </a:effectRef>
       <a:fontRef idx="minor"/>
@@ -4107,7 +4272,7 @@
       <a:fillRef idx="1">
         <a:scrgbClr r="0" g="0" b="0"/>
       </a:fillRef>
-      <a:effectRef idx="0">
+      <a:effectRef idx="2">
         <a:scrgbClr r="0" g="0" b="0"/>
       </a:effectRef>
       <a:fontRef idx="minor"/>
@@ -4127,7 +4292,7 @@
       <a:fillRef idx="1">
         <a:scrgbClr r="0" g="0" b="0"/>
       </a:fillRef>
-      <a:effectRef idx="0">
+      <a:effectRef idx="2">
         <a:scrgbClr r="0" g="0" b="0"/>
       </a:effectRef>
       <a:fontRef idx="minor"/>
@@ -4167,7 +4332,7 @@
       <a:fillRef idx="1">
         <a:scrgbClr r="0" g="0" b="0"/>
       </a:fillRef>
-      <a:effectRef idx="2">
+      <a:effectRef idx="3">
         <a:scrgbClr r="0" g="0" b="0"/>
       </a:effectRef>
       <a:fontRef idx="minor"/>
@@ -4207,7 +4372,7 @@
       <a:fillRef idx="3">
         <a:scrgbClr r="0" g="0" b="0"/>
       </a:fillRef>
-      <a:effectRef idx="2">
+      <a:effectRef idx="3">
         <a:scrgbClr r="0" g="0" b="0"/>
       </a:effectRef>
       <a:fontRef idx="minor"/>
@@ -4318,7 +4483,7 @@
           <a:p>
             <a:fld id="{C30C270E-9714-422B-B7EA-B510AECAFD34}" type="datetimeFigureOut">
               <a:rPr lang="pl-PL" smtClean="0"/>
-              <a:t>16.08.2020</a:t>
+              <a:t>19.08.2020</a:t>
             </a:fld>
             <a:endParaRPr lang="pl-PL"/>
           </a:p>
@@ -5217,7 +5382,7 @@
           <a:p>
             <a:fld id="{96D30BF6-FA71-4576-A5BC-BB4B1D1254CD}" type="datetimeFigureOut">
               <a:rPr lang="pl-PL" smtClean="0"/>
-              <a:t>16.08.2020</a:t>
+              <a:t>19.08.2020</a:t>
             </a:fld>
             <a:endParaRPr lang="pl-PL"/>
           </a:p>
@@ -5503,7 +5668,7 @@
           <a:p>
             <a:fld id="{96D30BF6-FA71-4576-A5BC-BB4B1D1254CD}" type="datetimeFigureOut">
               <a:rPr lang="pl-PL" smtClean="0"/>
-              <a:t>16.08.2020</a:t>
+              <a:t>19.08.2020</a:t>
             </a:fld>
             <a:endParaRPr lang="pl-PL"/>
           </a:p>
@@ -5695,7 +5860,7 @@
           <a:p>
             <a:fld id="{96D30BF6-FA71-4576-A5BC-BB4B1D1254CD}" type="datetimeFigureOut">
               <a:rPr lang="pl-PL" smtClean="0"/>
-              <a:t>16.08.2020</a:t>
+              <a:t>19.08.2020</a:t>
             </a:fld>
             <a:endParaRPr lang="pl-PL"/>
           </a:p>
@@ -5956,7 +6121,7 @@
           <a:p>
             <a:fld id="{96D30BF6-FA71-4576-A5BC-BB4B1D1254CD}" type="datetimeFigureOut">
               <a:rPr lang="pl-PL" smtClean="0"/>
-              <a:t>16.08.2020</a:t>
+              <a:t>19.08.2020</a:t>
             </a:fld>
             <a:endParaRPr lang="pl-PL"/>
           </a:p>
@@ -6382,7 +6547,7 @@
           <a:p>
             <a:fld id="{96D30BF6-FA71-4576-A5BC-BB4B1D1254CD}" type="datetimeFigureOut">
               <a:rPr lang="pl-PL" smtClean="0"/>
-              <a:t>16.08.2020</a:t>
+              <a:t>19.08.2020</a:t>
             </a:fld>
             <a:endParaRPr lang="pl-PL"/>
           </a:p>
@@ -6928,7 +7093,7 @@
           <a:p>
             <a:fld id="{96D30BF6-FA71-4576-A5BC-BB4B1D1254CD}" type="datetimeFigureOut">
               <a:rPr lang="pl-PL" smtClean="0"/>
-              <a:t>16.08.2020</a:t>
+              <a:t>19.08.2020</a:t>
             </a:fld>
             <a:endParaRPr lang="pl-PL"/>
           </a:p>
@@ -7759,7 +7924,7 @@
           <a:p>
             <a:fld id="{96D30BF6-FA71-4576-A5BC-BB4B1D1254CD}" type="datetimeFigureOut">
               <a:rPr lang="pl-PL" smtClean="0"/>
-              <a:t>16.08.2020</a:t>
+              <a:t>19.08.2020</a:t>
             </a:fld>
             <a:endParaRPr lang="pl-PL"/>
           </a:p>
@@ -7929,7 +8094,7 @@
           <a:p>
             <a:fld id="{96D30BF6-FA71-4576-A5BC-BB4B1D1254CD}" type="datetimeFigureOut">
               <a:rPr lang="pl-PL" smtClean="0"/>
-              <a:t>16.08.2020</a:t>
+              <a:t>19.08.2020</a:t>
             </a:fld>
             <a:endParaRPr lang="pl-PL"/>
           </a:p>
@@ -8109,7 +8274,7 @@
           <a:p>
             <a:fld id="{96D30BF6-FA71-4576-A5BC-BB4B1D1254CD}" type="datetimeFigureOut">
               <a:rPr lang="pl-PL" smtClean="0"/>
-              <a:t>16.08.2020</a:t>
+              <a:t>19.08.2020</a:t>
             </a:fld>
             <a:endParaRPr lang="pl-PL"/>
           </a:p>
@@ -8284,7 +8449,7 @@
           <a:p>
             <a:fld id="{96D30BF6-FA71-4576-A5BC-BB4B1D1254CD}" type="datetimeFigureOut">
               <a:rPr lang="pl-PL" smtClean="0"/>
-              <a:t>16.08.2020</a:t>
+              <a:t>19.08.2020</a:t>
             </a:fld>
             <a:endParaRPr lang="pl-PL"/>
           </a:p>
@@ -8541,7 +8706,7 @@
           <a:p>
             <a:fld id="{96D30BF6-FA71-4576-A5BC-BB4B1D1254CD}" type="datetimeFigureOut">
               <a:rPr lang="pl-PL" smtClean="0"/>
-              <a:t>16.08.2020</a:t>
+              <a:t>19.08.2020</a:t>
             </a:fld>
             <a:endParaRPr lang="pl-PL"/>
           </a:p>
@@ -8778,7 +8943,7 @@
           <a:p>
             <a:fld id="{96D30BF6-FA71-4576-A5BC-BB4B1D1254CD}" type="datetimeFigureOut">
               <a:rPr lang="pl-PL" smtClean="0"/>
-              <a:t>16.08.2020</a:t>
+              <a:t>19.08.2020</a:t>
             </a:fld>
             <a:endParaRPr lang="pl-PL"/>
           </a:p>
@@ -9171,7 +9336,7 @@
           <a:p>
             <a:fld id="{96D30BF6-FA71-4576-A5BC-BB4B1D1254CD}" type="datetimeFigureOut">
               <a:rPr lang="pl-PL" smtClean="0"/>
-              <a:t>16.08.2020</a:t>
+              <a:t>19.08.2020</a:t>
             </a:fld>
             <a:endParaRPr lang="pl-PL"/>
           </a:p>
@@ -9289,7 +9454,7 @@
           <a:p>
             <a:fld id="{96D30BF6-FA71-4576-A5BC-BB4B1D1254CD}" type="datetimeFigureOut">
               <a:rPr lang="pl-PL" smtClean="0"/>
-              <a:t>16.08.2020</a:t>
+              <a:t>19.08.2020</a:t>
             </a:fld>
             <a:endParaRPr lang="pl-PL"/>
           </a:p>
@@ -9384,7 +9549,7 @@
           <a:p>
             <a:fld id="{96D30BF6-FA71-4576-A5BC-BB4B1D1254CD}" type="datetimeFigureOut">
               <a:rPr lang="pl-PL" smtClean="0"/>
-              <a:t>16.08.2020</a:t>
+              <a:t>19.08.2020</a:t>
             </a:fld>
             <a:endParaRPr lang="pl-PL"/>
           </a:p>
@@ -9657,7 +9822,7 @@
           <a:p>
             <a:fld id="{96D30BF6-FA71-4576-A5BC-BB4B1D1254CD}" type="datetimeFigureOut">
               <a:rPr lang="pl-PL" smtClean="0"/>
-              <a:t>16.08.2020</a:t>
+              <a:t>19.08.2020</a:t>
             </a:fld>
             <a:endParaRPr lang="pl-PL"/>
           </a:p>
@@ -9938,7 +10103,7 @@
           <a:p>
             <a:fld id="{96D30BF6-FA71-4576-A5BC-BB4B1D1254CD}" type="datetimeFigureOut">
               <a:rPr lang="pl-PL" smtClean="0"/>
-              <a:t>16.08.2020</a:t>
+              <a:t>19.08.2020</a:t>
             </a:fld>
             <a:endParaRPr lang="pl-PL"/>
           </a:p>
@@ -10178,7 +10343,7 @@
           <a:p>
             <a:fld id="{96D30BF6-FA71-4576-A5BC-BB4B1D1254CD}" type="datetimeFigureOut">
               <a:rPr lang="pl-PL" smtClean="0"/>
-              <a:t>16.08.2020</a:t>
+              <a:t>19.08.2020</a:t>
             </a:fld>
             <a:endParaRPr lang="pl-PL"/>
           </a:p>
@@ -13541,145 +13706,6 @@
       </p:grpSpPr>
       <p:sp>
         <p:nvSpPr>
-          <p:cNvPr id="18" name="Rectangle 17">
-            <a:extLst>
-              <a:ext uri="{FF2B5EF4-FFF2-40B4-BE49-F238E27FC236}">
-                <a16:creationId xmlns:a16="http://schemas.microsoft.com/office/drawing/2014/main" id="{619B3503-D505-49AA-97C1-B299D58DB436}"/>
-              </a:ext>
-              <a:ext uri="{C183D7F6-B498-43B3-948B-1728B52AA6E4}">
-                <adec:decorative xmlns:adec="http://schemas.microsoft.com/office/drawing/2017/decorative" val="1"/>
-              </a:ext>
-            </a:extLst>
-          </p:cNvPr>
-          <p:cNvSpPr>
-            <a:spLocks noGrp="1" noRot="1" noChangeAspect="1" noMove="1" noResize="1" noEditPoints="1" noAdjustHandles="1" noChangeArrowheads="1" noChangeShapeType="1" noTextEdit="1"/>
-          </p:cNvSpPr>
-          <p:nvPr>
-            <p:extLst>
-              <p:ext uri="{386F3935-93C4-4BCD-93E2-E3B085C9AB24}">
-                <p16:designElem xmlns:p16="http://schemas.microsoft.com/office/powerpoint/2015/main" val="1"/>
-              </p:ext>
-            </p:extLst>
-          </p:nvPr>
-        </p:nvSpPr>
-        <p:spPr>
-          <a:xfrm>
-            <a:off x="4067746" y="0"/>
-            <a:ext cx="8124253" cy="6858000"/>
-          </a:xfrm>
-          <a:prstGeom prst="rect">
-            <a:avLst/>
-          </a:prstGeom>
-          <a:solidFill>
-            <a:schemeClr val="bg1">
-              <a:alpha val="20000"/>
-            </a:schemeClr>
-          </a:solidFill>
-          <a:ln>
-            <a:noFill/>
-          </a:ln>
-          <a:effectLst>
-            <a:innerShdw blurRad="139700" dist="50800" dir="5400000">
-              <a:prstClr val="black">
-                <a:alpha val="20000"/>
-              </a:prstClr>
-            </a:innerShdw>
-          </a:effectLst>
-        </p:spPr>
-        <p:style>
-          <a:lnRef idx="2">
-            <a:schemeClr val="accent1">
-              <a:shade val="50000"/>
-            </a:schemeClr>
-          </a:lnRef>
-          <a:fillRef idx="1">
-            <a:schemeClr val="accent1"/>
-          </a:fillRef>
-          <a:effectRef idx="0">
-            <a:schemeClr val="accent1"/>
-          </a:effectRef>
-          <a:fontRef idx="minor">
-            <a:schemeClr val="lt1"/>
-          </a:fontRef>
-        </p:style>
-        <p:txBody>
-          <a:bodyPr rtlCol="0" anchor="ctr"/>
-          <a:lstStyle/>
-          <a:p>
-            <a:pPr algn="ctr"/>
-            <a:endParaRPr lang="en-US"/>
-          </a:p>
-        </p:txBody>
-      </p:sp>
-      <p:sp useBgFill="1">
-        <p:nvSpPr>
-          <p:cNvPr id="20" name="Rectangle 19">
-            <a:extLst>
-              <a:ext uri="{FF2B5EF4-FFF2-40B4-BE49-F238E27FC236}">
-                <a16:creationId xmlns:a16="http://schemas.microsoft.com/office/drawing/2014/main" id="{E39A2319-946A-4C65-9B7C-1F86E9B1B57C}"/>
-              </a:ext>
-              <a:ext uri="{C183D7F6-B498-43B3-948B-1728B52AA6E4}">
-                <adec:decorative xmlns:adec="http://schemas.microsoft.com/office/drawing/2017/decorative" val="1"/>
-              </a:ext>
-            </a:extLst>
-          </p:cNvPr>
-          <p:cNvSpPr>
-            <a:spLocks noGrp="1" noRot="1" noChangeAspect="1" noMove="1" noResize="1" noEditPoints="1" noAdjustHandles="1" noChangeArrowheads="1" noChangeShapeType="1" noTextEdit="1"/>
-          </p:cNvSpPr>
-          <p:nvPr>
-            <p:extLst>
-              <p:ext uri="{386F3935-93C4-4BCD-93E2-E3B085C9AB24}">
-                <p16:designElem xmlns:p16="http://schemas.microsoft.com/office/powerpoint/2015/main" val="1"/>
-              </p:ext>
-            </p:extLst>
-          </p:nvPr>
-        </p:nvSpPr>
-        <p:spPr>
-          <a:xfrm>
-            <a:off x="0" y="1"/>
-            <a:ext cx="4067747" cy="6857996"/>
-          </a:xfrm>
-          <a:prstGeom prst="rect">
-            <a:avLst/>
-          </a:prstGeom>
-          <a:ln>
-            <a:noFill/>
-          </a:ln>
-          <a:effectLst>
-            <a:outerShdw blurRad="50800" dist="38100" algn="l" rotWithShape="0">
-              <a:prstClr val="black">
-                <a:alpha val="40000"/>
-              </a:prstClr>
-            </a:outerShdw>
-          </a:effectLst>
-        </p:spPr>
-        <p:style>
-          <a:lnRef idx="2">
-            <a:schemeClr val="accent1">
-              <a:shade val="50000"/>
-            </a:schemeClr>
-          </a:lnRef>
-          <a:fillRef idx="1">
-            <a:schemeClr val="accent1"/>
-          </a:fillRef>
-          <a:effectRef idx="0">
-            <a:schemeClr val="accent1"/>
-          </a:effectRef>
-          <a:fontRef idx="minor">
-            <a:schemeClr val="lt1"/>
-          </a:fontRef>
-        </p:style>
-        <p:txBody>
-          <a:bodyPr rtlCol="0" anchor="ctr"/>
-          <a:lstStyle/>
-          <a:p>
-            <a:pPr algn="ctr"/>
-            <a:endParaRPr lang="en-US"/>
-          </a:p>
-        </p:txBody>
-      </p:sp>
-      <p:sp>
-        <p:nvSpPr>
           <p:cNvPr id="2" name="Title 1">
             <a:extLst>
               <a:ext uri="{FF2B5EF4-FFF2-40B4-BE49-F238E27FC236}">
@@ -13696,18 +13722,18 @@
         </p:nvSpPr>
         <p:spPr>
           <a:xfrm>
-            <a:off x="647889" y="1349680"/>
-            <a:ext cx="2931320" cy="4449541"/>
+            <a:off x="838200" y="365125"/>
+            <a:ext cx="10515600" cy="1325563"/>
           </a:xfrm>
         </p:spPr>
         <p:txBody>
-          <a:bodyPr anchor="t">
+          <a:bodyPr>
             <a:normAutofit/>
           </a:bodyPr>
           <a:lstStyle/>
           <a:p>
             <a:r>
-              <a:rPr lang="pl-PL" sz="4800">
+              <a:rPr lang="pl-PL">
                 <a:solidFill>
                   <a:schemeClr val="tx1"/>
                 </a:solidFill>
@@ -13733,14 +13759,14 @@
             <p:ph idx="1"/>
             <p:extLst>
               <p:ext uri="{D42A27DB-BD31-4B8C-83A1-F6EECF244321}">
-                <p14:modId xmlns:p14="http://schemas.microsoft.com/office/powerpoint/2010/main" val="141265057"/>
+                <p14:modId xmlns:p14="http://schemas.microsoft.com/office/powerpoint/2010/main" val="1513587968"/>
               </p:ext>
             </p:extLst>
           </p:nvPr>
         </p:nvGraphicFramePr>
         <p:xfrm>
-          <a:off x="4662106" y="640075"/>
-          <a:ext cx="6912245" cy="5536883"/>
+          <a:off x="979488" y="1825625"/>
+          <a:ext cx="10233025" cy="4351338"/>
         </p:xfrm>
         <a:graphic>
           <a:graphicData uri="http://schemas.openxmlformats.org/drawingml/2006/diagram">
@@ -15340,10 +15366,13 @@
           <a:lstStyle/>
           <a:p>
             <a:r>
-              <a:rPr lang="pl-PL"/>
-              <a:t>Why do we test?</a:t>
-            </a:r>
-            <a:endParaRPr lang="pl-PL" dirty="0"/>
+              <a:rPr lang="pl-PL" dirty="0" err="1"/>
+              <a:t>Why</a:t>
+            </a:r>
+            <a:r>
+              <a:rPr lang="pl-PL" dirty="0"/>
+              <a:t> do we test I?</a:t>
+            </a:r>
           </a:p>
         </p:txBody>
       </p:sp>
@@ -15686,8 +15715,13 @@
             </a:r>
             <a:r>
               <a:rPr lang="pl-PL" dirty="0"/>
-              <a:t> do we test?</a:t>
-            </a:r>
+              <a:t> do </a:t>
+            </a:r>
+            <a:r>
+              <a:rPr lang="pl-PL"/>
+              <a:t>we test II?</a:t>
+            </a:r>
+            <a:endParaRPr lang="pl-PL" dirty="0"/>
           </a:p>
         </p:txBody>
       </p:sp>
@@ -17548,21 +17582,6 @@
 </file>
 
 <file path=customXml/item1.xml><?xml version="1.0" encoding="utf-8"?>
-<p:properties xmlns:p="http://schemas.microsoft.com/office/2006/metadata/properties" xmlns:xsi="http://www.w3.org/2001/XMLSchema-instance" xmlns:pc="http://schemas.microsoft.com/office/infopath/2007/PartnerControls">
-  <documentManagement/>
-</p:properties>
-</file>
-
-<file path=customXml/item2.xml><?xml version="1.0" encoding="utf-8"?>
-<?mso-contentType ?>
-<FormTemplates xmlns="http://schemas.microsoft.com/sharepoint/v3/contenttype/forms">
-  <Display>DocumentLibraryForm</Display>
-  <Edit>DocumentLibraryForm</Edit>
-  <New>DocumentLibraryForm</New>
-</FormTemplates>
-</file>
-
-<file path=customXml/item3.xml><?xml version="1.0" encoding="utf-8"?>
 <ct:contentTypeSchema xmlns:ct="http://schemas.microsoft.com/office/2006/metadata/contentType" xmlns:ma="http://schemas.microsoft.com/office/2006/metadata/properties/metaAttributes" ct:_="" ma:_="" ma:contentTypeName="Document" ma:contentTypeID="0x0101005184BFB4BA16AE4A9EE3C8BEF74D50A3" ma:contentTypeVersion="0" ma:contentTypeDescription="Create a new document." ma:contentTypeScope="" ma:versionID="d720147679065e31ecdf65c55fc0bc3a">
   <xsd:schema xmlns:xsd="http://www.w3.org/2001/XMLSchema" xmlns:xs="http://www.w3.org/2001/XMLSchema" xmlns:p="http://schemas.microsoft.com/office/2006/metadata/properties" targetNamespace="http://schemas.microsoft.com/office/2006/metadata/properties" ma:root="true" ma:fieldsID="43a7841bbb0f157a6d10fa10cd875d67">
     <xsd:element name="properties">
@@ -17676,17 +17695,33 @@
 </ct:contentTypeSchema>
 </file>
 
+<file path=customXml/item2.xml><?xml version="1.0" encoding="utf-8"?>
+<?mso-contentType ?>
+<FormTemplates xmlns="http://schemas.microsoft.com/sharepoint/v3/contenttype/forms">
+  <Display>DocumentLibraryForm</Display>
+  <Edit>DocumentLibraryForm</Edit>
+  <New>DocumentLibraryForm</New>
+</FormTemplates>
+</file>
+
+<file path=customXml/item3.xml><?xml version="1.0" encoding="utf-8"?>
+<p:properties xmlns:p="http://schemas.microsoft.com/office/2006/metadata/properties" xmlns:xsi="http://www.w3.org/2001/XMLSchema-instance" xmlns:pc="http://schemas.microsoft.com/office/infopath/2007/PartnerControls">
+  <documentManagement/>
+</p:properties>
+</file>
+
 <file path=customXml/itemProps1.xml><?xml version="1.0" encoding="utf-8"?>
-<ds:datastoreItem xmlns:ds="http://schemas.openxmlformats.org/officeDocument/2006/customXml" ds:itemID="{C31CB5AC-A9CE-4DFD-A397-B798A6EA1D99}">
+<ds:datastoreItem xmlns:ds="http://schemas.openxmlformats.org/officeDocument/2006/customXml" ds:itemID="{847A727C-7D80-4E88-AE0A-B9AE0A316E4A}">
   <ds:schemaRefs>
-    <ds:schemaRef ds:uri="http://schemas.microsoft.com/office/2006/documentManagement/types"/>
+    <ds:schemaRef ds:uri="http://schemas.microsoft.com/office/2006/metadata/contentType"/>
+    <ds:schemaRef ds:uri="http://schemas.microsoft.com/office/2006/metadata/properties/metaAttributes"/>
+    <ds:schemaRef ds:uri="http://www.w3.org/2001/XMLSchema"/>
     <ds:schemaRef ds:uri="http://schemas.microsoft.com/office/2006/metadata/properties"/>
     <ds:schemaRef ds:uri="http://schemas.openxmlformats.org/package/2006/metadata/core-properties"/>
-    <ds:schemaRef ds:uri="http://purl.org/dc/dcmitype/"/>
+    <ds:schemaRef ds:uri="http://purl.org/dc/elements/1.1/"/>
     <ds:schemaRef ds:uri="http://purl.org/dc/terms/"/>
-    <ds:schemaRef ds:uri="http://purl.org/dc/elements/1.1/"/>
+    <ds:schemaRef ds:uri="http://schemas.microsoft.com/internal/obd"/>
     <ds:schemaRef ds:uri="http://schemas.microsoft.com/office/infopath/2007/PartnerControls"/>
-    <ds:schemaRef ds:uri="http://www.w3.org/XML/1998/namespace"/>
   </ds:schemaRefs>
 </ds:datastoreItem>
 </file>
@@ -17700,17 +17735,16 @@
 </file>
 
 <file path=customXml/itemProps3.xml><?xml version="1.0" encoding="utf-8"?>
-<ds:datastoreItem xmlns:ds="http://schemas.openxmlformats.org/officeDocument/2006/customXml" ds:itemID="{847A727C-7D80-4E88-AE0A-B9AE0A316E4A}">
+<ds:datastoreItem xmlns:ds="http://schemas.openxmlformats.org/officeDocument/2006/customXml" ds:itemID="{C31CB5AC-A9CE-4DFD-A397-B798A6EA1D99}">
   <ds:schemaRefs>
-    <ds:schemaRef ds:uri="http://schemas.microsoft.com/office/2006/metadata/contentType"/>
-    <ds:schemaRef ds:uri="http://schemas.microsoft.com/office/2006/metadata/properties/metaAttributes"/>
-    <ds:schemaRef ds:uri="http://www.w3.org/2001/XMLSchema"/>
+    <ds:schemaRef ds:uri="http://schemas.microsoft.com/office/2006/documentManagement/types"/>
     <ds:schemaRef ds:uri="http://schemas.microsoft.com/office/2006/metadata/properties"/>
     <ds:schemaRef ds:uri="http://schemas.openxmlformats.org/package/2006/metadata/core-properties"/>
+    <ds:schemaRef ds:uri="http://purl.org/dc/dcmitype/"/>
+    <ds:schemaRef ds:uri="http://purl.org/dc/terms/"/>
     <ds:schemaRef ds:uri="http://purl.org/dc/elements/1.1/"/>
-    <ds:schemaRef ds:uri="http://purl.org/dc/terms/"/>
-    <ds:schemaRef ds:uri="http://schemas.microsoft.com/internal/obd"/>
     <ds:schemaRef ds:uri="http://schemas.microsoft.com/office/infopath/2007/PartnerControls"/>
+    <ds:schemaRef ds:uri="http://www.w3.org/XML/1998/namespace"/>
   </ds:schemaRefs>
 </ds:datastoreItem>
 </file>
</xml_diff>